<commit_message>
rewrote lesson based on feedback
</commit_message>
<xml_diff>
--- a/CLI-lesson/Navigating a File System.pptx
+++ b/CLI-lesson/Navigating a File System.pptx
@@ -1,6 +1,6 @@
 
 <file path=ppt/presentation.xml><?xml version="1.0" encoding="utf-8"?>
-<p:presentation xmlns:a="http://schemas.openxmlformats.org/drawingml/2006/main" xmlns:r="http://schemas.openxmlformats.org/officeDocument/2006/relationships" xmlns:mc="http://schemas.openxmlformats.org/markup-compatibility/2006" xmlns:mv="urn:schemas-microsoft-com:mac:vml" xmlns:p="http://schemas.openxmlformats.org/presentationml/2006/main" xmlns:c="http://schemas.openxmlformats.org/drawingml/2006/chart" xmlns:dgm="http://schemas.openxmlformats.org/drawingml/2006/diagram" xmlns:o="urn:schemas-microsoft-com:office:office" xmlns:v="urn:schemas-microsoft-com:vml" xmlns:pvml="urn:schemas-microsoft-com:office:powerpoint" xmlns:com="http://schemas.openxmlformats.org/drawingml/2006/compatibility" xmlns:p14="http://schemas.microsoft.com/office/powerpoint/2010/main" xmlns:p15="http://schemas.microsoft.com/office/powerpoint/2012/main" autoCompressPictures="0" strictFirstAndLastChars="0" saveSubsetFonts="1">
+<p:presentation xmlns:a="http://schemas.openxmlformats.org/drawingml/2006/main" xmlns:r="http://schemas.openxmlformats.org/officeDocument/2006/relationships" xmlns:mc="http://schemas.openxmlformats.org/markup-compatibility/2006" xmlns:mv="urn:schemas-microsoft-com:mac:vml" xmlns:p="http://schemas.openxmlformats.org/presentationml/2006/main" xmlns:c="http://schemas.openxmlformats.org/drawingml/2006/chart" xmlns:dgm="http://schemas.openxmlformats.org/drawingml/2006/diagram" xmlns:o="urn:schemas-microsoft-com:office:office" xmlns:v="urn:schemas-microsoft-com:vml" xmlns:pvml="urn:schemas-microsoft-com:office:powerpoint" xmlns:com="http://schemas.openxmlformats.org/drawingml/2006/compatibility" xmlns:p14="http://schemas.microsoft.com/office/powerpoint/2010/main" xmlns:p15="http://schemas.microsoft.com/office/powerpoint/2012/main" xmlns:ahyp="http://schemas.microsoft.com/office/drawing/2018/hyperlinkcolor" autoCompressPictures="0" strictFirstAndLastChars="0" saveSubsetFonts="1">
   <p:sldMasterIdLst>
     <p:sldMasterId id="2147483660" r:id="rId3"/>
   </p:sldMasterIdLst>
@@ -14,6 +14,8 @@
     <p:sldId id="259" r:id="rId8"/>
     <p:sldId id="260" r:id="rId9"/>
     <p:sldId id="261" r:id="rId10"/>
+    <p:sldId id="262" r:id="rId11"/>
+    <p:sldId id="263" r:id="rId12"/>
   </p:sldIdLst>
   <p:sldSz cy="5670550" cx="10080625"/>
   <p:notesSz cx="7772400" cy="10058400"/>
@@ -250,7 +252,7 @@
 </file>
 
 <file path=ppt/notesMasters/notesMaster1.xml><?xml version="1.0" encoding="utf-8"?>
-<p:notesMaster xmlns:a="http://schemas.openxmlformats.org/drawingml/2006/main" xmlns:r="http://schemas.openxmlformats.org/officeDocument/2006/relationships" xmlns:mc="http://schemas.openxmlformats.org/markup-compatibility/2006" xmlns:mv="urn:schemas-microsoft-com:mac:vml" xmlns:p="http://schemas.openxmlformats.org/presentationml/2006/main" xmlns:c="http://schemas.openxmlformats.org/drawingml/2006/chart" xmlns:dgm="http://schemas.openxmlformats.org/drawingml/2006/diagram" xmlns:o="urn:schemas-microsoft-com:office:office" xmlns:v="urn:schemas-microsoft-com:vml" xmlns:pvml="urn:schemas-microsoft-com:office:powerpoint" xmlns:com="http://schemas.openxmlformats.org/drawingml/2006/compatibility" xmlns:p14="http://schemas.microsoft.com/office/powerpoint/2010/main" xmlns:p15="http://schemas.microsoft.com/office/powerpoint/2012/main">
+<p:notesMaster xmlns:a="http://schemas.openxmlformats.org/drawingml/2006/main" xmlns:r="http://schemas.openxmlformats.org/officeDocument/2006/relationships" xmlns:mc="http://schemas.openxmlformats.org/markup-compatibility/2006" xmlns:mv="urn:schemas-microsoft-com:mac:vml" xmlns:p="http://schemas.openxmlformats.org/presentationml/2006/main" xmlns:c="http://schemas.openxmlformats.org/drawingml/2006/chart" xmlns:dgm="http://schemas.openxmlformats.org/drawingml/2006/diagram" xmlns:o="urn:schemas-microsoft-com:office:office" xmlns:v="urn:schemas-microsoft-com:vml" xmlns:pvml="urn:schemas-microsoft-com:office:powerpoint" xmlns:com="http://schemas.openxmlformats.org/drawingml/2006/compatibility" xmlns:p14="http://schemas.microsoft.com/office/powerpoint/2010/main" xmlns:p15="http://schemas.microsoft.com/office/powerpoint/2012/main" xmlns:ahyp="http://schemas.microsoft.com/office/drawing/2018/hyperlinkcolor">
   <p:cSld>
     <p:spTree>
       <p:nvGrpSpPr>
@@ -676,7 +678,7 @@
 </file>
 
 <file path=ppt/notesSlides/notesSlide1.xml><?xml version="1.0" encoding="utf-8"?>
-<p:notes xmlns:a="http://schemas.openxmlformats.org/drawingml/2006/main" xmlns:r="http://schemas.openxmlformats.org/officeDocument/2006/relationships" xmlns:mc="http://schemas.openxmlformats.org/markup-compatibility/2006" xmlns:mv="urn:schemas-microsoft-com:mac:vml" xmlns:p="http://schemas.openxmlformats.org/presentationml/2006/main" xmlns:c="http://schemas.openxmlformats.org/drawingml/2006/chart" xmlns:dgm="http://schemas.openxmlformats.org/drawingml/2006/diagram" xmlns:o="urn:schemas-microsoft-com:office:office" xmlns:v="urn:schemas-microsoft-com:vml" xmlns:pvml="urn:schemas-microsoft-com:office:powerpoint" xmlns:com="http://schemas.openxmlformats.org/drawingml/2006/compatibility" xmlns:p14="http://schemas.microsoft.com/office/powerpoint/2010/main" xmlns:p15="http://schemas.microsoft.com/office/powerpoint/2012/main" showMasterPhAnim="0" showMasterSp="0">
+<p:notes xmlns:a="http://schemas.openxmlformats.org/drawingml/2006/main" xmlns:r="http://schemas.openxmlformats.org/officeDocument/2006/relationships" xmlns:mc="http://schemas.openxmlformats.org/markup-compatibility/2006" xmlns:mv="urn:schemas-microsoft-com:mac:vml" xmlns:p="http://schemas.openxmlformats.org/presentationml/2006/main" xmlns:c="http://schemas.openxmlformats.org/drawingml/2006/chart" xmlns:dgm="http://schemas.openxmlformats.org/drawingml/2006/diagram" xmlns:o="urn:schemas-microsoft-com:office:office" xmlns:v="urn:schemas-microsoft-com:vml" xmlns:pvml="urn:schemas-microsoft-com:office:powerpoint" xmlns:com="http://schemas.openxmlformats.org/drawingml/2006/compatibility" xmlns:p14="http://schemas.microsoft.com/office/powerpoint/2010/main" xmlns:p15="http://schemas.microsoft.com/office/powerpoint/2012/main" xmlns:ahyp="http://schemas.microsoft.com/office/drawing/2018/hyperlinkcolor" showMasterPhAnim="0" showMasterSp="0">
   <p:cSld>
     <p:spTree>
       <p:nvGrpSpPr>
@@ -775,7 +777,7 @@
 </file>
 
 <file path=ppt/notesSlides/notesSlide2.xml><?xml version="1.0" encoding="utf-8"?>
-<p:notes xmlns:a="http://schemas.openxmlformats.org/drawingml/2006/main" xmlns:r="http://schemas.openxmlformats.org/officeDocument/2006/relationships" xmlns:mc="http://schemas.openxmlformats.org/markup-compatibility/2006" xmlns:mv="urn:schemas-microsoft-com:mac:vml" xmlns:p="http://schemas.openxmlformats.org/presentationml/2006/main" xmlns:c="http://schemas.openxmlformats.org/drawingml/2006/chart" xmlns:dgm="http://schemas.openxmlformats.org/drawingml/2006/diagram" xmlns:o="urn:schemas-microsoft-com:office:office" xmlns:v="urn:schemas-microsoft-com:vml" xmlns:pvml="urn:schemas-microsoft-com:office:powerpoint" xmlns:com="http://schemas.openxmlformats.org/drawingml/2006/compatibility" xmlns:p14="http://schemas.microsoft.com/office/powerpoint/2010/main" xmlns:p15="http://schemas.microsoft.com/office/powerpoint/2012/main" showMasterPhAnim="0" showMasterSp="0">
+<p:notes xmlns:a="http://schemas.openxmlformats.org/drawingml/2006/main" xmlns:r="http://schemas.openxmlformats.org/officeDocument/2006/relationships" xmlns:mc="http://schemas.openxmlformats.org/markup-compatibility/2006" xmlns:mv="urn:schemas-microsoft-com:mac:vml" xmlns:p="http://schemas.openxmlformats.org/presentationml/2006/main" xmlns:c="http://schemas.openxmlformats.org/drawingml/2006/chart" xmlns:dgm="http://schemas.openxmlformats.org/drawingml/2006/diagram" xmlns:o="urn:schemas-microsoft-com:office:office" xmlns:v="urn:schemas-microsoft-com:vml" xmlns:pvml="urn:schemas-microsoft-com:office:powerpoint" xmlns:com="http://schemas.openxmlformats.org/drawingml/2006/compatibility" xmlns:p14="http://schemas.microsoft.com/office/powerpoint/2010/main" xmlns:p15="http://schemas.microsoft.com/office/powerpoint/2012/main" xmlns:ahyp="http://schemas.microsoft.com/office/drawing/2018/hyperlinkcolor" showMasterPhAnim="0" showMasterSp="0">
   <p:cSld>
     <p:spTree>
       <p:nvGrpSpPr>
@@ -874,7 +876,7 @@
 </file>
 
 <file path=ppt/notesSlides/notesSlide3.xml><?xml version="1.0" encoding="utf-8"?>
-<p:notes xmlns:a="http://schemas.openxmlformats.org/drawingml/2006/main" xmlns:r="http://schemas.openxmlformats.org/officeDocument/2006/relationships" xmlns:mc="http://schemas.openxmlformats.org/markup-compatibility/2006" xmlns:mv="urn:schemas-microsoft-com:mac:vml" xmlns:p="http://schemas.openxmlformats.org/presentationml/2006/main" xmlns:c="http://schemas.openxmlformats.org/drawingml/2006/chart" xmlns:dgm="http://schemas.openxmlformats.org/drawingml/2006/diagram" xmlns:o="urn:schemas-microsoft-com:office:office" xmlns:v="urn:schemas-microsoft-com:vml" xmlns:pvml="urn:schemas-microsoft-com:office:powerpoint" xmlns:com="http://schemas.openxmlformats.org/drawingml/2006/compatibility" xmlns:p14="http://schemas.microsoft.com/office/powerpoint/2010/main" xmlns:p15="http://schemas.microsoft.com/office/powerpoint/2012/main" showMasterPhAnim="0" showMasterSp="0">
+<p:notes xmlns:a="http://schemas.openxmlformats.org/drawingml/2006/main" xmlns:r="http://schemas.openxmlformats.org/officeDocument/2006/relationships" xmlns:mc="http://schemas.openxmlformats.org/markup-compatibility/2006" xmlns:mv="urn:schemas-microsoft-com:mac:vml" xmlns:p="http://schemas.openxmlformats.org/presentationml/2006/main" xmlns:c="http://schemas.openxmlformats.org/drawingml/2006/chart" xmlns:dgm="http://schemas.openxmlformats.org/drawingml/2006/diagram" xmlns:o="urn:schemas-microsoft-com:office:office" xmlns:v="urn:schemas-microsoft-com:vml" xmlns:pvml="urn:schemas-microsoft-com:office:powerpoint" xmlns:com="http://schemas.openxmlformats.org/drawingml/2006/compatibility" xmlns:p14="http://schemas.microsoft.com/office/powerpoint/2010/main" xmlns:p15="http://schemas.microsoft.com/office/powerpoint/2012/main" xmlns:ahyp="http://schemas.microsoft.com/office/drawing/2018/hyperlinkcolor" showMasterPhAnim="0" showMasterSp="0">
   <p:cSld>
     <p:spTree>
       <p:nvGrpSpPr>
@@ -973,7 +975,7 @@
 </file>
 
 <file path=ppt/notesSlides/notesSlide4.xml><?xml version="1.0" encoding="utf-8"?>
-<p:notes xmlns:a="http://schemas.openxmlformats.org/drawingml/2006/main" xmlns:r="http://schemas.openxmlformats.org/officeDocument/2006/relationships" xmlns:mc="http://schemas.openxmlformats.org/markup-compatibility/2006" xmlns:mv="urn:schemas-microsoft-com:mac:vml" xmlns:p="http://schemas.openxmlformats.org/presentationml/2006/main" xmlns:c="http://schemas.openxmlformats.org/drawingml/2006/chart" xmlns:dgm="http://schemas.openxmlformats.org/drawingml/2006/diagram" xmlns:o="urn:schemas-microsoft-com:office:office" xmlns:v="urn:schemas-microsoft-com:vml" xmlns:pvml="urn:schemas-microsoft-com:office:powerpoint" xmlns:com="http://schemas.openxmlformats.org/drawingml/2006/compatibility" xmlns:p14="http://schemas.microsoft.com/office/powerpoint/2010/main" xmlns:p15="http://schemas.microsoft.com/office/powerpoint/2012/main" showMasterPhAnim="0" showMasterSp="0">
+<p:notes xmlns:a="http://schemas.openxmlformats.org/drawingml/2006/main" xmlns:r="http://schemas.openxmlformats.org/officeDocument/2006/relationships" xmlns:mc="http://schemas.openxmlformats.org/markup-compatibility/2006" xmlns:mv="urn:schemas-microsoft-com:mac:vml" xmlns:p="http://schemas.openxmlformats.org/presentationml/2006/main" xmlns:c="http://schemas.openxmlformats.org/drawingml/2006/chart" xmlns:dgm="http://schemas.openxmlformats.org/drawingml/2006/diagram" xmlns:o="urn:schemas-microsoft-com:office:office" xmlns:v="urn:schemas-microsoft-com:vml" xmlns:pvml="urn:schemas-microsoft-com:office:powerpoint" xmlns:com="http://schemas.openxmlformats.org/drawingml/2006/compatibility" xmlns:p14="http://schemas.microsoft.com/office/powerpoint/2010/main" xmlns:p15="http://schemas.microsoft.com/office/powerpoint/2012/main" xmlns:ahyp="http://schemas.microsoft.com/office/drawing/2018/hyperlinkcolor" showMasterPhAnim="0" showMasterSp="0">
   <p:cSld>
     <p:spTree>
       <p:nvGrpSpPr>
@@ -1072,7 +1074,7 @@
 </file>
 
 <file path=ppt/notesSlides/notesSlide5.xml><?xml version="1.0" encoding="utf-8"?>
-<p:notes xmlns:a="http://schemas.openxmlformats.org/drawingml/2006/main" xmlns:r="http://schemas.openxmlformats.org/officeDocument/2006/relationships" xmlns:mc="http://schemas.openxmlformats.org/markup-compatibility/2006" xmlns:mv="urn:schemas-microsoft-com:mac:vml" xmlns:p="http://schemas.openxmlformats.org/presentationml/2006/main" xmlns:c="http://schemas.openxmlformats.org/drawingml/2006/chart" xmlns:dgm="http://schemas.openxmlformats.org/drawingml/2006/diagram" xmlns:o="urn:schemas-microsoft-com:office:office" xmlns:v="urn:schemas-microsoft-com:vml" xmlns:pvml="urn:schemas-microsoft-com:office:powerpoint" xmlns:com="http://schemas.openxmlformats.org/drawingml/2006/compatibility" xmlns:p14="http://schemas.microsoft.com/office/powerpoint/2010/main" xmlns:p15="http://schemas.microsoft.com/office/powerpoint/2012/main" showMasterPhAnim="0" showMasterSp="0">
+<p:notes xmlns:a="http://schemas.openxmlformats.org/drawingml/2006/main" xmlns:r="http://schemas.openxmlformats.org/officeDocument/2006/relationships" xmlns:mc="http://schemas.openxmlformats.org/markup-compatibility/2006" xmlns:mv="urn:schemas-microsoft-com:mac:vml" xmlns:p="http://schemas.openxmlformats.org/presentationml/2006/main" xmlns:c="http://schemas.openxmlformats.org/drawingml/2006/chart" xmlns:dgm="http://schemas.openxmlformats.org/drawingml/2006/diagram" xmlns:o="urn:schemas-microsoft-com:office:office" xmlns:v="urn:schemas-microsoft-com:vml" xmlns:pvml="urn:schemas-microsoft-com:office:powerpoint" xmlns:com="http://schemas.openxmlformats.org/drawingml/2006/compatibility" xmlns:p14="http://schemas.microsoft.com/office/powerpoint/2010/main" xmlns:p15="http://schemas.microsoft.com/office/powerpoint/2012/main" xmlns:ahyp="http://schemas.microsoft.com/office/drawing/2018/hyperlinkcolor" showMasterPhAnim="0" showMasterSp="0">
   <p:cSld>
     <p:spTree>
       <p:nvGrpSpPr>
@@ -1090,7 +1092,7 @@
       </p:grpSpPr>
       <p:sp>
         <p:nvSpPr>
-          <p:cNvPr id="96" name="Google Shape;96;g868f51dc84_0_3:notes"/>
+          <p:cNvPr id="96" name="Google Shape;96;g8d2013d6eb_1_0:notes"/>
           <p:cNvSpPr txBox="1"/>
           <p:nvPr>
             <p:ph idx="1" type="body"/>
@@ -1129,7 +1131,7 @@
       </p:sp>
       <p:sp>
         <p:nvSpPr>
-          <p:cNvPr id="97" name="Google Shape;97;g868f51dc84_0_3:notes"/>
+          <p:cNvPr id="97" name="Google Shape;97;g8d2013d6eb_1_0:notes"/>
           <p:cNvSpPr/>
           <p:nvPr>
             <p:ph idx="2" type="sldImg"/>
@@ -1171,7 +1173,7 @@
 </file>
 
 <file path=ppt/notesSlides/notesSlide6.xml><?xml version="1.0" encoding="utf-8"?>
-<p:notes xmlns:a="http://schemas.openxmlformats.org/drawingml/2006/main" xmlns:r="http://schemas.openxmlformats.org/officeDocument/2006/relationships" xmlns:mc="http://schemas.openxmlformats.org/markup-compatibility/2006" xmlns:mv="urn:schemas-microsoft-com:mac:vml" xmlns:p="http://schemas.openxmlformats.org/presentationml/2006/main" xmlns:c="http://schemas.openxmlformats.org/drawingml/2006/chart" xmlns:dgm="http://schemas.openxmlformats.org/drawingml/2006/diagram" xmlns:o="urn:schemas-microsoft-com:office:office" xmlns:v="urn:schemas-microsoft-com:vml" xmlns:pvml="urn:schemas-microsoft-com:office:powerpoint" xmlns:com="http://schemas.openxmlformats.org/drawingml/2006/compatibility" xmlns:p14="http://schemas.microsoft.com/office/powerpoint/2010/main" xmlns:p15="http://schemas.microsoft.com/office/powerpoint/2012/main" showMasterPhAnim="0" showMasterSp="0">
+<p:notes xmlns:a="http://schemas.openxmlformats.org/drawingml/2006/main" xmlns:r="http://schemas.openxmlformats.org/officeDocument/2006/relationships" xmlns:mc="http://schemas.openxmlformats.org/markup-compatibility/2006" xmlns:mv="urn:schemas-microsoft-com:mac:vml" xmlns:p="http://schemas.openxmlformats.org/presentationml/2006/main" xmlns:c="http://schemas.openxmlformats.org/drawingml/2006/chart" xmlns:dgm="http://schemas.openxmlformats.org/drawingml/2006/diagram" xmlns:o="urn:schemas-microsoft-com:office:office" xmlns:v="urn:schemas-microsoft-com:vml" xmlns:pvml="urn:schemas-microsoft-com:office:powerpoint" xmlns:com="http://schemas.openxmlformats.org/drawingml/2006/compatibility" xmlns:p14="http://schemas.microsoft.com/office/powerpoint/2010/main" xmlns:p15="http://schemas.microsoft.com/office/powerpoint/2012/main" xmlns:ahyp="http://schemas.microsoft.com/office/drawing/2018/hyperlinkcolor" showMasterPhAnim="0" showMasterSp="0">
   <p:cSld>
     <p:spTree>
       <p:nvGrpSpPr>
@@ -1269,8 +1271,206 @@
 </p:notes>
 </file>
 
+<file path=ppt/notesSlides/notesSlide7.xml><?xml version="1.0" encoding="utf-8"?>
+<p:notes xmlns:a="http://schemas.openxmlformats.org/drawingml/2006/main" xmlns:r="http://schemas.openxmlformats.org/officeDocument/2006/relationships" xmlns:mc="http://schemas.openxmlformats.org/markup-compatibility/2006" xmlns:mv="urn:schemas-microsoft-com:mac:vml" xmlns:p="http://schemas.openxmlformats.org/presentationml/2006/main" xmlns:c="http://schemas.openxmlformats.org/drawingml/2006/chart" xmlns:dgm="http://schemas.openxmlformats.org/drawingml/2006/diagram" xmlns:o="urn:schemas-microsoft-com:office:office" xmlns:v="urn:schemas-microsoft-com:vml" xmlns:pvml="urn:schemas-microsoft-com:office:powerpoint" xmlns:com="http://schemas.openxmlformats.org/drawingml/2006/compatibility" xmlns:p14="http://schemas.microsoft.com/office/powerpoint/2010/main" xmlns:p15="http://schemas.microsoft.com/office/powerpoint/2012/main" xmlns:ahyp="http://schemas.microsoft.com/office/drawing/2018/hyperlinkcolor" showMasterPhAnim="0" showMasterSp="0">
+  <p:cSld>
+    <p:spTree>
+      <p:nvGrpSpPr>
+        <p:cNvPr id="113" name="Shape 113"/>
+        <p:cNvGrpSpPr/>
+        <p:nvPr/>
+      </p:nvGrpSpPr>
+      <p:grpSpPr>
+        <a:xfrm>
+          <a:off x="0" y="0"/>
+          <a:ext cx="0" cy="0"/>
+          <a:chOff x="0" y="0"/>
+          <a:chExt cx="0" cy="0"/>
+        </a:xfrm>
+      </p:grpSpPr>
+      <p:sp>
+        <p:nvSpPr>
+          <p:cNvPr id="114" name="Google Shape;114;g8d2013d6eb_1_8:notes"/>
+          <p:cNvSpPr txBox="1"/>
+          <p:nvPr>
+            <p:ph idx="1" type="body"/>
+          </p:nvPr>
+        </p:nvSpPr>
+        <p:spPr>
+          <a:xfrm>
+            <a:off x="777225" y="4777725"/>
+            <a:ext cx="6217800" cy="4526400"/>
+          </a:xfrm>
+          <a:prstGeom prst="rect">
+            <a:avLst/>
+          </a:prstGeom>
+        </p:spPr>
+        <p:txBody>
+          <a:bodyPr anchorCtr="0" anchor="t" bIns="91425" lIns="91425" spcFirstLastPara="1" rIns="91425" wrap="square" tIns="91425">
+            <a:noAutofit/>
+          </a:bodyPr>
+          <a:lstStyle/>
+          <a:p>
+            <a:pPr indent="0" lvl="0" marL="0" rtl="0" algn="l">
+              <a:spcBef>
+                <a:spcPts val="0"/>
+              </a:spcBef>
+              <a:spcAft>
+                <a:spcPts val="0"/>
+              </a:spcAft>
+              <a:buNone/>
+            </a:pPr>
+            <a:r>
+              <a:t/>
+            </a:r>
+            <a:endParaRPr/>
+          </a:p>
+        </p:txBody>
+      </p:sp>
+      <p:sp>
+        <p:nvSpPr>
+          <p:cNvPr id="115" name="Google Shape;115;g8d2013d6eb_1_8:notes"/>
+          <p:cNvSpPr/>
+          <p:nvPr>
+            <p:ph idx="2" type="sldImg"/>
+          </p:nvPr>
+        </p:nvSpPr>
+        <p:spPr>
+          <a:xfrm>
+            <a:off x="1295650" y="754375"/>
+            <a:ext cx="5181900" cy="3771900"/>
+          </a:xfrm>
+          <a:custGeom>
+            <a:rect b="b" l="l" r="r" t="t"/>
+            <a:pathLst>
+              <a:path extrusionOk="0" h="120000" w="120000">
+                <a:moveTo>
+                  <a:pt x="0" y="0"/>
+                </a:moveTo>
+                <a:lnTo>
+                  <a:pt x="120000" y="0"/>
+                </a:lnTo>
+                <a:lnTo>
+                  <a:pt x="120000" y="120000"/>
+                </a:lnTo>
+                <a:lnTo>
+                  <a:pt x="0" y="120000"/>
+                </a:lnTo>
+                <a:close/>
+              </a:path>
+            </a:pathLst>
+          </a:custGeom>
+        </p:spPr>
+      </p:sp>
+    </p:spTree>
+  </p:cSld>
+  <p:clrMapOvr>
+    <a:masterClrMapping/>
+  </p:clrMapOvr>
+</p:notes>
+</file>
+
+<file path=ppt/notesSlides/notesSlide8.xml><?xml version="1.0" encoding="utf-8"?>
+<p:notes xmlns:a="http://schemas.openxmlformats.org/drawingml/2006/main" xmlns:r="http://schemas.openxmlformats.org/officeDocument/2006/relationships" xmlns:mc="http://schemas.openxmlformats.org/markup-compatibility/2006" xmlns:mv="urn:schemas-microsoft-com:mac:vml" xmlns:p="http://schemas.openxmlformats.org/presentationml/2006/main" xmlns:c="http://schemas.openxmlformats.org/drawingml/2006/chart" xmlns:dgm="http://schemas.openxmlformats.org/drawingml/2006/diagram" xmlns:o="urn:schemas-microsoft-com:office:office" xmlns:v="urn:schemas-microsoft-com:vml" xmlns:pvml="urn:schemas-microsoft-com:office:powerpoint" xmlns:com="http://schemas.openxmlformats.org/drawingml/2006/compatibility" xmlns:p14="http://schemas.microsoft.com/office/powerpoint/2010/main" xmlns:p15="http://schemas.microsoft.com/office/powerpoint/2012/main" xmlns:ahyp="http://schemas.microsoft.com/office/drawing/2018/hyperlinkcolor" showMasterPhAnim="0" showMasterSp="0">
+  <p:cSld>
+    <p:spTree>
+      <p:nvGrpSpPr>
+        <p:cNvPr id="121" name="Shape 121"/>
+        <p:cNvGrpSpPr/>
+        <p:nvPr/>
+      </p:nvGrpSpPr>
+      <p:grpSpPr>
+        <a:xfrm>
+          <a:off x="0" y="0"/>
+          <a:ext cx="0" cy="0"/>
+          <a:chOff x="0" y="0"/>
+          <a:chExt cx="0" cy="0"/>
+        </a:xfrm>
+      </p:grpSpPr>
+      <p:sp>
+        <p:nvSpPr>
+          <p:cNvPr id="122" name="Google Shape;122;g868f51dc84_0_3:notes"/>
+          <p:cNvSpPr txBox="1"/>
+          <p:nvPr>
+            <p:ph idx="1" type="body"/>
+          </p:nvPr>
+        </p:nvSpPr>
+        <p:spPr>
+          <a:xfrm>
+            <a:off x="777225" y="4777725"/>
+            <a:ext cx="6217800" cy="4526400"/>
+          </a:xfrm>
+          <a:prstGeom prst="rect">
+            <a:avLst/>
+          </a:prstGeom>
+        </p:spPr>
+        <p:txBody>
+          <a:bodyPr anchorCtr="0" anchor="t" bIns="91425" lIns="91425" spcFirstLastPara="1" rIns="91425" wrap="square" tIns="91425">
+            <a:noAutofit/>
+          </a:bodyPr>
+          <a:lstStyle/>
+          <a:p>
+            <a:pPr indent="0" lvl="0" marL="0" rtl="0" algn="l">
+              <a:spcBef>
+                <a:spcPts val="0"/>
+              </a:spcBef>
+              <a:spcAft>
+                <a:spcPts val="0"/>
+              </a:spcAft>
+              <a:buNone/>
+            </a:pPr>
+            <a:r>
+              <a:t/>
+            </a:r>
+            <a:endParaRPr/>
+          </a:p>
+        </p:txBody>
+      </p:sp>
+      <p:sp>
+        <p:nvSpPr>
+          <p:cNvPr id="123" name="Google Shape;123;g868f51dc84_0_3:notes"/>
+          <p:cNvSpPr/>
+          <p:nvPr>
+            <p:ph idx="2" type="sldImg"/>
+          </p:nvPr>
+        </p:nvSpPr>
+        <p:spPr>
+          <a:xfrm>
+            <a:off x="1295650" y="754375"/>
+            <a:ext cx="5181900" cy="3771900"/>
+          </a:xfrm>
+          <a:custGeom>
+            <a:rect b="b" l="l" r="r" t="t"/>
+            <a:pathLst>
+              <a:path extrusionOk="0" h="120000" w="120000">
+                <a:moveTo>
+                  <a:pt x="0" y="0"/>
+                </a:moveTo>
+                <a:lnTo>
+                  <a:pt x="120000" y="0"/>
+                </a:lnTo>
+                <a:lnTo>
+                  <a:pt x="120000" y="120000"/>
+                </a:lnTo>
+                <a:lnTo>
+                  <a:pt x="0" y="120000"/>
+                </a:lnTo>
+                <a:close/>
+              </a:path>
+            </a:pathLst>
+          </a:custGeom>
+        </p:spPr>
+      </p:sp>
+    </p:spTree>
+  </p:cSld>
+  <p:clrMapOvr>
+    <a:masterClrMapping/>
+  </p:clrMapOvr>
+</p:notes>
+</file>
+
 <file path=ppt/slideLayouts/slideLayout1.xml><?xml version="1.0" encoding="utf-8"?>
-<p:sldLayout xmlns:a="http://schemas.openxmlformats.org/drawingml/2006/main" xmlns:r="http://schemas.openxmlformats.org/officeDocument/2006/relationships" xmlns:mc="http://schemas.openxmlformats.org/markup-compatibility/2006" xmlns:mv="urn:schemas-microsoft-com:mac:vml" xmlns:p="http://schemas.openxmlformats.org/presentationml/2006/main" xmlns:c="http://schemas.openxmlformats.org/drawingml/2006/chart" xmlns:dgm="http://schemas.openxmlformats.org/drawingml/2006/diagram" xmlns:o="urn:schemas-microsoft-com:office:office" xmlns:v="urn:schemas-microsoft-com:vml" xmlns:pvml="urn:schemas-microsoft-com:office:powerpoint" xmlns:com="http://schemas.openxmlformats.org/drawingml/2006/compatibility" xmlns:p14="http://schemas.microsoft.com/office/powerpoint/2010/main" xmlns:p15="http://schemas.microsoft.com/office/powerpoint/2012/main" matchingName="Title, Content" type="obj">
+<p:sldLayout xmlns:a="http://schemas.openxmlformats.org/drawingml/2006/main" xmlns:r="http://schemas.openxmlformats.org/officeDocument/2006/relationships" xmlns:mc="http://schemas.openxmlformats.org/markup-compatibility/2006" xmlns:mv="urn:schemas-microsoft-com:mac:vml" xmlns:p="http://schemas.openxmlformats.org/presentationml/2006/main" xmlns:c="http://schemas.openxmlformats.org/drawingml/2006/chart" xmlns:dgm="http://schemas.openxmlformats.org/drawingml/2006/diagram" xmlns:o="urn:schemas-microsoft-com:office:office" xmlns:v="urn:schemas-microsoft-com:vml" xmlns:pvml="urn:schemas-microsoft-com:office:powerpoint" xmlns:com="http://schemas.openxmlformats.org/drawingml/2006/compatibility" xmlns:p14="http://schemas.microsoft.com/office/powerpoint/2010/main" xmlns:p15="http://schemas.microsoft.com/office/powerpoint/2012/main" xmlns:ahyp="http://schemas.microsoft.com/office/drawing/2018/hyperlinkcolor" matchingName="Title, Content" type="obj">
   <p:cSld name="OBJECT">
     <p:spTree>
       <p:nvGrpSpPr>
@@ -1613,7 +1813,7 @@
 </file>
 
 <file path=ppt/slideLayouts/slideLayout10.xml><?xml version="1.0" encoding="utf-8"?>
-<p:sldLayout xmlns:a="http://schemas.openxmlformats.org/drawingml/2006/main" xmlns:r="http://schemas.openxmlformats.org/officeDocument/2006/relationships" xmlns:mc="http://schemas.openxmlformats.org/markup-compatibility/2006" xmlns:mv="urn:schemas-microsoft-com:mac:vml" xmlns:p="http://schemas.openxmlformats.org/presentationml/2006/main" xmlns:c="http://schemas.openxmlformats.org/drawingml/2006/chart" xmlns:dgm="http://schemas.openxmlformats.org/drawingml/2006/diagram" xmlns:o="urn:schemas-microsoft-com:office:office" xmlns:v="urn:schemas-microsoft-com:vml" xmlns:pvml="urn:schemas-microsoft-com:office:powerpoint" xmlns:com="http://schemas.openxmlformats.org/drawingml/2006/compatibility" xmlns:p14="http://schemas.microsoft.com/office/powerpoint/2010/main" xmlns:p15="http://schemas.microsoft.com/office/powerpoint/2012/main" matchingName="Title, Content over Content" type="objOverTx">
+<p:sldLayout xmlns:a="http://schemas.openxmlformats.org/drawingml/2006/main" xmlns:r="http://schemas.openxmlformats.org/officeDocument/2006/relationships" xmlns:mc="http://schemas.openxmlformats.org/markup-compatibility/2006" xmlns:mv="urn:schemas-microsoft-com:mac:vml" xmlns:p="http://schemas.openxmlformats.org/presentationml/2006/main" xmlns:c="http://schemas.openxmlformats.org/drawingml/2006/chart" xmlns:dgm="http://schemas.openxmlformats.org/drawingml/2006/diagram" xmlns:o="urn:schemas-microsoft-com:office:office" xmlns:v="urn:schemas-microsoft-com:vml" xmlns:pvml="urn:schemas-microsoft-com:office:powerpoint" xmlns:com="http://schemas.openxmlformats.org/drawingml/2006/compatibility" xmlns:p14="http://schemas.microsoft.com/office/powerpoint/2010/main" xmlns:p15="http://schemas.microsoft.com/office/powerpoint/2012/main" xmlns:ahyp="http://schemas.microsoft.com/office/drawing/2018/hyperlinkcolor" matchingName="Title, Content over Content" type="objOverTx">
   <p:cSld name="OBJECT_OVER_TEXT">
     <p:spTree>
       <p:nvGrpSpPr>
@@ -2139,7 +2339,7 @@
 </file>
 
 <file path=ppt/slideLayouts/slideLayout11.xml><?xml version="1.0" encoding="utf-8"?>
-<p:sldLayout xmlns:a="http://schemas.openxmlformats.org/drawingml/2006/main" xmlns:r="http://schemas.openxmlformats.org/officeDocument/2006/relationships" xmlns:mc="http://schemas.openxmlformats.org/markup-compatibility/2006" xmlns:mv="urn:schemas-microsoft-com:mac:vml" xmlns:p="http://schemas.openxmlformats.org/presentationml/2006/main" xmlns:c="http://schemas.openxmlformats.org/drawingml/2006/chart" xmlns:dgm="http://schemas.openxmlformats.org/drawingml/2006/diagram" xmlns:o="urn:schemas-microsoft-com:office:office" xmlns:v="urn:schemas-microsoft-com:vml" xmlns:pvml="urn:schemas-microsoft-com:office:powerpoint" xmlns:com="http://schemas.openxmlformats.org/drawingml/2006/compatibility" xmlns:p14="http://schemas.microsoft.com/office/powerpoint/2010/main" xmlns:p15="http://schemas.microsoft.com/office/powerpoint/2012/main" matchingName="Title, 4 Content" type="fourObj">
+<p:sldLayout xmlns:a="http://schemas.openxmlformats.org/drawingml/2006/main" xmlns:r="http://schemas.openxmlformats.org/officeDocument/2006/relationships" xmlns:mc="http://schemas.openxmlformats.org/markup-compatibility/2006" xmlns:mv="urn:schemas-microsoft-com:mac:vml" xmlns:p="http://schemas.openxmlformats.org/presentationml/2006/main" xmlns:c="http://schemas.openxmlformats.org/drawingml/2006/chart" xmlns:dgm="http://schemas.openxmlformats.org/drawingml/2006/diagram" xmlns:o="urn:schemas-microsoft-com:office:office" xmlns:v="urn:schemas-microsoft-com:vml" xmlns:pvml="urn:schemas-microsoft-com:office:powerpoint" xmlns:com="http://schemas.openxmlformats.org/drawingml/2006/compatibility" xmlns:p14="http://schemas.microsoft.com/office/powerpoint/2010/main" xmlns:p15="http://schemas.microsoft.com/office/powerpoint/2012/main" xmlns:ahyp="http://schemas.microsoft.com/office/drawing/2018/hyperlinkcolor" matchingName="Title, 4 Content" type="fourObj">
   <p:cSld name="FOUR_OBJECTS">
     <p:spTree>
       <p:nvGrpSpPr>
@@ -3031,7 +3231,7 @@
 </file>
 
 <file path=ppt/slideLayouts/slideLayout12.xml><?xml version="1.0" encoding="utf-8"?>
-<p:sldLayout xmlns:a="http://schemas.openxmlformats.org/drawingml/2006/main" xmlns:r="http://schemas.openxmlformats.org/officeDocument/2006/relationships" xmlns:mc="http://schemas.openxmlformats.org/markup-compatibility/2006" xmlns:mv="urn:schemas-microsoft-com:mac:vml" xmlns:p="http://schemas.openxmlformats.org/presentationml/2006/main" xmlns:c="http://schemas.openxmlformats.org/drawingml/2006/chart" xmlns:dgm="http://schemas.openxmlformats.org/drawingml/2006/diagram" xmlns:o="urn:schemas-microsoft-com:office:office" xmlns:v="urn:schemas-microsoft-com:vml" xmlns:pvml="urn:schemas-microsoft-com:office:powerpoint" xmlns:com="http://schemas.openxmlformats.org/drawingml/2006/compatibility" xmlns:p14="http://schemas.microsoft.com/office/powerpoint/2010/main" xmlns:p15="http://schemas.microsoft.com/office/powerpoint/2012/main" matchingName="Title, 6 Content">
+<p:sldLayout xmlns:a="http://schemas.openxmlformats.org/drawingml/2006/main" xmlns:r="http://schemas.openxmlformats.org/officeDocument/2006/relationships" xmlns:mc="http://schemas.openxmlformats.org/markup-compatibility/2006" xmlns:mv="urn:schemas-microsoft-com:mac:vml" xmlns:p="http://schemas.openxmlformats.org/presentationml/2006/main" xmlns:c="http://schemas.openxmlformats.org/drawingml/2006/chart" xmlns:dgm="http://schemas.openxmlformats.org/drawingml/2006/diagram" xmlns:o="urn:schemas-microsoft-com:office:office" xmlns:v="urn:schemas-microsoft-com:vml" xmlns:pvml="urn:schemas-microsoft-com:office:powerpoint" xmlns:com="http://schemas.openxmlformats.org/drawingml/2006/compatibility" xmlns:p14="http://schemas.microsoft.com/office/powerpoint/2010/main" xmlns:p15="http://schemas.microsoft.com/office/powerpoint/2012/main" xmlns:ahyp="http://schemas.microsoft.com/office/drawing/2018/hyperlinkcolor" matchingName="Title, 6 Content">
   <p:cSld name="Title, 6 Content">
     <p:spTree>
       <p:nvGrpSpPr>
@@ -4289,7 +4489,7 @@
 </file>
 
 <file path=ppt/slideLayouts/slideLayout2.xml><?xml version="1.0" encoding="utf-8"?>
-<p:sldLayout xmlns:a="http://schemas.openxmlformats.org/drawingml/2006/main" xmlns:r="http://schemas.openxmlformats.org/officeDocument/2006/relationships" xmlns:mc="http://schemas.openxmlformats.org/markup-compatibility/2006" xmlns:mv="urn:schemas-microsoft-com:mac:vml" xmlns:p="http://schemas.openxmlformats.org/presentationml/2006/main" xmlns:c="http://schemas.openxmlformats.org/drawingml/2006/chart" xmlns:dgm="http://schemas.openxmlformats.org/drawingml/2006/diagram" xmlns:o="urn:schemas-microsoft-com:office:office" xmlns:v="urn:schemas-microsoft-com:vml" xmlns:pvml="urn:schemas-microsoft-com:office:powerpoint" xmlns:com="http://schemas.openxmlformats.org/drawingml/2006/compatibility" xmlns:p14="http://schemas.microsoft.com/office/powerpoint/2010/main" xmlns:p15="http://schemas.microsoft.com/office/powerpoint/2012/main" matchingName="Blank Slide" type="blank">
+<p:sldLayout xmlns:a="http://schemas.openxmlformats.org/drawingml/2006/main" xmlns:r="http://schemas.openxmlformats.org/officeDocument/2006/relationships" xmlns:mc="http://schemas.openxmlformats.org/markup-compatibility/2006" xmlns:mv="urn:schemas-microsoft-com:mac:vml" xmlns:p="http://schemas.openxmlformats.org/presentationml/2006/main" xmlns:c="http://schemas.openxmlformats.org/drawingml/2006/chart" xmlns:dgm="http://schemas.openxmlformats.org/drawingml/2006/diagram" xmlns:o="urn:schemas-microsoft-com:office:office" xmlns:v="urn:schemas-microsoft-com:vml" xmlns:pvml="urn:schemas-microsoft-com:office:powerpoint" xmlns:com="http://schemas.openxmlformats.org/drawingml/2006/compatibility" xmlns:p14="http://schemas.microsoft.com/office/powerpoint/2010/main" xmlns:p15="http://schemas.microsoft.com/office/powerpoint/2012/main" xmlns:ahyp="http://schemas.microsoft.com/office/drawing/2018/hyperlinkcolor" matchingName="Blank Slide" type="blank">
   <p:cSld name="BLANK">
     <p:spTree>
       <p:nvGrpSpPr>
@@ -4314,7 +4514,7 @@
 </file>
 
 <file path=ppt/slideLayouts/slideLayout3.xml><?xml version="1.0" encoding="utf-8"?>
-<p:sldLayout xmlns:a="http://schemas.openxmlformats.org/drawingml/2006/main" xmlns:r="http://schemas.openxmlformats.org/officeDocument/2006/relationships" xmlns:mc="http://schemas.openxmlformats.org/markup-compatibility/2006" xmlns:mv="urn:schemas-microsoft-com:mac:vml" xmlns:p="http://schemas.openxmlformats.org/presentationml/2006/main" xmlns:c="http://schemas.openxmlformats.org/drawingml/2006/chart" xmlns:dgm="http://schemas.openxmlformats.org/drawingml/2006/diagram" xmlns:o="urn:schemas-microsoft-com:office:office" xmlns:v="urn:schemas-microsoft-com:vml" xmlns:pvml="urn:schemas-microsoft-com:office:powerpoint" xmlns:com="http://schemas.openxmlformats.org/drawingml/2006/compatibility" xmlns:p14="http://schemas.microsoft.com/office/powerpoint/2010/main" xmlns:p15="http://schemas.microsoft.com/office/powerpoint/2012/main" matchingName="Title Slide" type="tx">
+<p:sldLayout xmlns:a="http://schemas.openxmlformats.org/drawingml/2006/main" xmlns:r="http://schemas.openxmlformats.org/officeDocument/2006/relationships" xmlns:mc="http://schemas.openxmlformats.org/markup-compatibility/2006" xmlns:mv="urn:schemas-microsoft-com:mac:vml" xmlns:p="http://schemas.openxmlformats.org/presentationml/2006/main" xmlns:c="http://schemas.openxmlformats.org/drawingml/2006/chart" xmlns:dgm="http://schemas.openxmlformats.org/drawingml/2006/diagram" xmlns:o="urn:schemas-microsoft-com:office:office" xmlns:v="urn:schemas-microsoft-com:vml" xmlns:pvml="urn:schemas-microsoft-com:office:powerpoint" xmlns:com="http://schemas.openxmlformats.org/drawingml/2006/compatibility" xmlns:p14="http://schemas.microsoft.com/office/powerpoint/2010/main" xmlns:p15="http://schemas.microsoft.com/office/powerpoint/2012/main" xmlns:ahyp="http://schemas.microsoft.com/office/drawing/2018/hyperlinkcolor" matchingName="Title Slide" type="tx">
   <p:cSld name="TITLE_AND_BODY">
     <p:spTree>
       <p:nvGrpSpPr>
@@ -4657,7 +4857,7 @@
 </file>
 
 <file path=ppt/slideLayouts/slideLayout4.xml><?xml version="1.0" encoding="utf-8"?>
-<p:sldLayout xmlns:a="http://schemas.openxmlformats.org/drawingml/2006/main" xmlns:r="http://schemas.openxmlformats.org/officeDocument/2006/relationships" xmlns:mc="http://schemas.openxmlformats.org/markup-compatibility/2006" xmlns:mv="urn:schemas-microsoft-com:mac:vml" xmlns:p="http://schemas.openxmlformats.org/presentationml/2006/main" xmlns:c="http://schemas.openxmlformats.org/drawingml/2006/chart" xmlns:dgm="http://schemas.openxmlformats.org/drawingml/2006/diagram" xmlns:o="urn:schemas-microsoft-com:office:office" xmlns:v="urn:schemas-microsoft-com:vml" xmlns:pvml="urn:schemas-microsoft-com:office:powerpoint" xmlns:com="http://schemas.openxmlformats.org/drawingml/2006/compatibility" xmlns:p14="http://schemas.microsoft.com/office/powerpoint/2010/main" xmlns:p15="http://schemas.microsoft.com/office/powerpoint/2012/main" matchingName="Title, 2 Content" type="twoObj">
+<p:sldLayout xmlns:a="http://schemas.openxmlformats.org/drawingml/2006/main" xmlns:r="http://schemas.openxmlformats.org/officeDocument/2006/relationships" xmlns:mc="http://schemas.openxmlformats.org/markup-compatibility/2006" xmlns:mv="urn:schemas-microsoft-com:mac:vml" xmlns:p="http://schemas.openxmlformats.org/presentationml/2006/main" xmlns:c="http://schemas.openxmlformats.org/drawingml/2006/chart" xmlns:dgm="http://schemas.openxmlformats.org/drawingml/2006/diagram" xmlns:o="urn:schemas-microsoft-com:office:office" xmlns:v="urn:schemas-microsoft-com:vml" xmlns:pvml="urn:schemas-microsoft-com:office:powerpoint" xmlns:com="http://schemas.openxmlformats.org/drawingml/2006/compatibility" xmlns:p14="http://schemas.microsoft.com/office/powerpoint/2010/main" xmlns:p15="http://schemas.microsoft.com/office/powerpoint/2012/main" xmlns:ahyp="http://schemas.microsoft.com/office/drawing/2018/hyperlinkcolor" matchingName="Title, 2 Content" type="twoObj">
   <p:cSld name="TWO_OBJECTS">
     <p:spTree>
       <p:nvGrpSpPr>
@@ -5183,7 +5383,7 @@
 </file>
 
 <file path=ppt/slideLayouts/slideLayout5.xml><?xml version="1.0" encoding="utf-8"?>
-<p:sldLayout xmlns:a="http://schemas.openxmlformats.org/drawingml/2006/main" xmlns:r="http://schemas.openxmlformats.org/officeDocument/2006/relationships" xmlns:mc="http://schemas.openxmlformats.org/markup-compatibility/2006" xmlns:mv="urn:schemas-microsoft-com:mac:vml" xmlns:p="http://schemas.openxmlformats.org/presentationml/2006/main" xmlns:c="http://schemas.openxmlformats.org/drawingml/2006/chart" xmlns:dgm="http://schemas.openxmlformats.org/drawingml/2006/diagram" xmlns:o="urn:schemas-microsoft-com:office:office" xmlns:v="urn:schemas-microsoft-com:vml" xmlns:pvml="urn:schemas-microsoft-com:office:powerpoint" xmlns:com="http://schemas.openxmlformats.org/drawingml/2006/compatibility" xmlns:p14="http://schemas.microsoft.com/office/powerpoint/2010/main" xmlns:p15="http://schemas.microsoft.com/office/powerpoint/2012/main" matchingName="Title Only" type="titleOnly">
+<p:sldLayout xmlns:a="http://schemas.openxmlformats.org/drawingml/2006/main" xmlns:r="http://schemas.openxmlformats.org/officeDocument/2006/relationships" xmlns:mc="http://schemas.openxmlformats.org/markup-compatibility/2006" xmlns:mv="urn:schemas-microsoft-com:mac:vml" xmlns:p="http://schemas.openxmlformats.org/presentationml/2006/main" xmlns:c="http://schemas.openxmlformats.org/drawingml/2006/chart" xmlns:dgm="http://schemas.openxmlformats.org/drawingml/2006/diagram" xmlns:o="urn:schemas-microsoft-com:office:office" xmlns:v="urn:schemas-microsoft-com:vml" xmlns:pvml="urn:schemas-microsoft-com:office:powerpoint" xmlns:com="http://schemas.openxmlformats.org/drawingml/2006/compatibility" xmlns:p14="http://schemas.microsoft.com/office/powerpoint/2010/main" xmlns:p15="http://schemas.microsoft.com/office/powerpoint/2012/main" xmlns:ahyp="http://schemas.microsoft.com/office/drawing/2018/hyperlinkcolor" matchingName="Title Only" type="titleOnly">
   <p:cSld name="TITLE_ONLY">
     <p:spTree>
       <p:nvGrpSpPr>
@@ -5343,7 +5543,7 @@
 </file>
 
 <file path=ppt/slideLayouts/slideLayout6.xml><?xml version="1.0" encoding="utf-8"?>
-<p:sldLayout xmlns:a="http://schemas.openxmlformats.org/drawingml/2006/main" xmlns:r="http://schemas.openxmlformats.org/officeDocument/2006/relationships" xmlns:mc="http://schemas.openxmlformats.org/markup-compatibility/2006" xmlns:mv="urn:schemas-microsoft-com:mac:vml" xmlns:p="http://schemas.openxmlformats.org/presentationml/2006/main" xmlns:c="http://schemas.openxmlformats.org/drawingml/2006/chart" xmlns:dgm="http://schemas.openxmlformats.org/drawingml/2006/diagram" xmlns:o="urn:schemas-microsoft-com:office:office" xmlns:v="urn:schemas-microsoft-com:vml" xmlns:pvml="urn:schemas-microsoft-com:office:powerpoint" xmlns:com="http://schemas.openxmlformats.org/drawingml/2006/compatibility" xmlns:p14="http://schemas.microsoft.com/office/powerpoint/2010/main" xmlns:p15="http://schemas.microsoft.com/office/powerpoint/2012/main" matchingName="Centered Text" type="objOnly">
+<p:sldLayout xmlns:a="http://schemas.openxmlformats.org/drawingml/2006/main" xmlns:r="http://schemas.openxmlformats.org/officeDocument/2006/relationships" xmlns:mc="http://schemas.openxmlformats.org/markup-compatibility/2006" xmlns:mv="urn:schemas-microsoft-com:mac:vml" xmlns:p="http://schemas.openxmlformats.org/presentationml/2006/main" xmlns:c="http://schemas.openxmlformats.org/drawingml/2006/chart" xmlns:dgm="http://schemas.openxmlformats.org/drawingml/2006/diagram" xmlns:o="urn:schemas-microsoft-com:office:office" xmlns:v="urn:schemas-microsoft-com:vml" xmlns:pvml="urn:schemas-microsoft-com:office:powerpoint" xmlns:com="http://schemas.openxmlformats.org/drawingml/2006/compatibility" xmlns:p14="http://schemas.microsoft.com/office/powerpoint/2010/main" xmlns:p15="http://schemas.microsoft.com/office/powerpoint/2012/main" xmlns:ahyp="http://schemas.microsoft.com/office/drawing/2018/hyperlinkcolor" matchingName="Centered Text" type="objOnly">
   <p:cSld name="OBJECT_ONLY">
     <p:spTree>
       <p:nvGrpSpPr>
@@ -5551,7 +5751,7 @@
 </file>
 
 <file path=ppt/slideLayouts/slideLayout7.xml><?xml version="1.0" encoding="utf-8"?>
-<p:sldLayout xmlns:a="http://schemas.openxmlformats.org/drawingml/2006/main" xmlns:r="http://schemas.openxmlformats.org/officeDocument/2006/relationships" xmlns:mc="http://schemas.openxmlformats.org/markup-compatibility/2006" xmlns:mv="urn:schemas-microsoft-com:mac:vml" xmlns:p="http://schemas.openxmlformats.org/presentationml/2006/main" xmlns:c="http://schemas.openxmlformats.org/drawingml/2006/chart" xmlns:dgm="http://schemas.openxmlformats.org/drawingml/2006/diagram" xmlns:o="urn:schemas-microsoft-com:office:office" xmlns:v="urn:schemas-microsoft-com:vml" xmlns:pvml="urn:schemas-microsoft-com:office:powerpoint" xmlns:com="http://schemas.openxmlformats.org/drawingml/2006/compatibility" xmlns:p14="http://schemas.microsoft.com/office/powerpoint/2010/main" xmlns:p15="http://schemas.microsoft.com/office/powerpoint/2012/main" matchingName="Title, 2 Content and Content" type="twoObjAndObj">
+<p:sldLayout xmlns:a="http://schemas.openxmlformats.org/drawingml/2006/main" xmlns:r="http://schemas.openxmlformats.org/officeDocument/2006/relationships" xmlns:mc="http://schemas.openxmlformats.org/markup-compatibility/2006" xmlns:mv="urn:schemas-microsoft-com:mac:vml" xmlns:p="http://schemas.openxmlformats.org/presentationml/2006/main" xmlns:c="http://schemas.openxmlformats.org/drawingml/2006/chart" xmlns:dgm="http://schemas.openxmlformats.org/drawingml/2006/diagram" xmlns:o="urn:schemas-microsoft-com:office:office" xmlns:v="urn:schemas-microsoft-com:vml" xmlns:pvml="urn:schemas-microsoft-com:office:powerpoint" xmlns:com="http://schemas.openxmlformats.org/drawingml/2006/compatibility" xmlns:p14="http://schemas.microsoft.com/office/powerpoint/2010/main" xmlns:p15="http://schemas.microsoft.com/office/powerpoint/2012/main" xmlns:ahyp="http://schemas.microsoft.com/office/drawing/2018/hyperlinkcolor" matchingName="Title, 2 Content and Content" type="twoObjAndObj">
   <p:cSld name="TWO_OBJECTS_AND_OBJECT">
     <p:spTree>
       <p:nvGrpSpPr>
@@ -6260,7 +6460,7 @@
 </file>
 
 <file path=ppt/slideLayouts/slideLayout8.xml><?xml version="1.0" encoding="utf-8"?>
-<p:sldLayout xmlns:a="http://schemas.openxmlformats.org/drawingml/2006/main" xmlns:r="http://schemas.openxmlformats.org/officeDocument/2006/relationships" xmlns:mc="http://schemas.openxmlformats.org/markup-compatibility/2006" xmlns:mv="urn:schemas-microsoft-com:mac:vml" xmlns:p="http://schemas.openxmlformats.org/presentationml/2006/main" xmlns:c="http://schemas.openxmlformats.org/drawingml/2006/chart" xmlns:dgm="http://schemas.openxmlformats.org/drawingml/2006/diagram" xmlns:o="urn:schemas-microsoft-com:office:office" xmlns:v="urn:schemas-microsoft-com:vml" xmlns:pvml="urn:schemas-microsoft-com:office:powerpoint" xmlns:com="http://schemas.openxmlformats.org/drawingml/2006/compatibility" xmlns:p14="http://schemas.microsoft.com/office/powerpoint/2010/main" xmlns:p15="http://schemas.microsoft.com/office/powerpoint/2012/main" matchingName="Title Content and 2 Content" type="objAndTwoObj">
+<p:sldLayout xmlns:a="http://schemas.openxmlformats.org/drawingml/2006/main" xmlns:r="http://schemas.openxmlformats.org/officeDocument/2006/relationships" xmlns:mc="http://schemas.openxmlformats.org/markup-compatibility/2006" xmlns:mv="urn:schemas-microsoft-com:mac:vml" xmlns:p="http://schemas.openxmlformats.org/presentationml/2006/main" xmlns:c="http://schemas.openxmlformats.org/drawingml/2006/chart" xmlns:dgm="http://schemas.openxmlformats.org/drawingml/2006/diagram" xmlns:o="urn:schemas-microsoft-com:office:office" xmlns:v="urn:schemas-microsoft-com:vml" xmlns:pvml="urn:schemas-microsoft-com:office:powerpoint" xmlns:com="http://schemas.openxmlformats.org/drawingml/2006/compatibility" xmlns:p14="http://schemas.microsoft.com/office/powerpoint/2010/main" xmlns:p15="http://schemas.microsoft.com/office/powerpoint/2012/main" xmlns:ahyp="http://schemas.microsoft.com/office/drawing/2018/hyperlinkcolor" matchingName="Title Content and 2 Content" type="objAndTwoObj">
   <p:cSld name="OBJECT_AND_TWO_OBJECTS">
     <p:spTree>
       <p:nvGrpSpPr>
@@ -6969,7 +7169,7 @@
 </file>
 
 <file path=ppt/slideLayouts/slideLayout9.xml><?xml version="1.0" encoding="utf-8"?>
-<p:sldLayout xmlns:a="http://schemas.openxmlformats.org/drawingml/2006/main" xmlns:r="http://schemas.openxmlformats.org/officeDocument/2006/relationships" xmlns:mc="http://schemas.openxmlformats.org/markup-compatibility/2006" xmlns:mv="urn:schemas-microsoft-com:mac:vml" xmlns:p="http://schemas.openxmlformats.org/presentationml/2006/main" xmlns:c="http://schemas.openxmlformats.org/drawingml/2006/chart" xmlns:dgm="http://schemas.openxmlformats.org/drawingml/2006/diagram" xmlns:o="urn:schemas-microsoft-com:office:office" xmlns:v="urn:schemas-microsoft-com:vml" xmlns:pvml="urn:schemas-microsoft-com:office:powerpoint" xmlns:com="http://schemas.openxmlformats.org/drawingml/2006/compatibility" xmlns:p14="http://schemas.microsoft.com/office/powerpoint/2010/main" xmlns:p15="http://schemas.microsoft.com/office/powerpoint/2012/main" matchingName="Title, 2 Content over Content" type="twoObjOverTx">
+<p:sldLayout xmlns:a="http://schemas.openxmlformats.org/drawingml/2006/main" xmlns:r="http://schemas.openxmlformats.org/officeDocument/2006/relationships" xmlns:mc="http://schemas.openxmlformats.org/markup-compatibility/2006" xmlns:mv="urn:schemas-microsoft-com:mac:vml" xmlns:p="http://schemas.openxmlformats.org/presentationml/2006/main" xmlns:c="http://schemas.openxmlformats.org/drawingml/2006/chart" xmlns:dgm="http://schemas.openxmlformats.org/drawingml/2006/diagram" xmlns:o="urn:schemas-microsoft-com:office:office" xmlns:v="urn:schemas-microsoft-com:vml" xmlns:pvml="urn:schemas-microsoft-com:office:powerpoint" xmlns:com="http://schemas.openxmlformats.org/drawingml/2006/compatibility" xmlns:p14="http://schemas.microsoft.com/office/powerpoint/2010/main" xmlns:p15="http://schemas.microsoft.com/office/powerpoint/2012/main" xmlns:ahyp="http://schemas.microsoft.com/office/drawing/2018/hyperlinkcolor" matchingName="Title, 2 Content over Content" type="twoObjOverTx">
   <p:cSld name="TWO_OBJECTS_OVER_TEXT">
     <p:spTree>
       <p:nvGrpSpPr>
@@ -7678,7 +7878,7 @@
 </file>
 
 <file path=ppt/slideMasters/slideMaster1.xml><?xml version="1.0" encoding="utf-8"?>
-<p:sldMaster xmlns:a="http://schemas.openxmlformats.org/drawingml/2006/main" xmlns:r="http://schemas.openxmlformats.org/officeDocument/2006/relationships" xmlns:mc="http://schemas.openxmlformats.org/markup-compatibility/2006" xmlns:mv="urn:schemas-microsoft-com:mac:vml" xmlns:p="http://schemas.openxmlformats.org/presentationml/2006/main" xmlns:c="http://schemas.openxmlformats.org/drawingml/2006/chart" xmlns:dgm="http://schemas.openxmlformats.org/drawingml/2006/diagram" xmlns:o="urn:schemas-microsoft-com:office:office" xmlns:v="urn:schemas-microsoft-com:vml" xmlns:pvml="urn:schemas-microsoft-com:office:powerpoint" xmlns:com="http://schemas.openxmlformats.org/drawingml/2006/compatibility" xmlns:p14="http://schemas.microsoft.com/office/powerpoint/2010/main" xmlns:p15="http://schemas.microsoft.com/office/powerpoint/2012/main">
+<p:sldMaster xmlns:a="http://schemas.openxmlformats.org/drawingml/2006/main" xmlns:r="http://schemas.openxmlformats.org/officeDocument/2006/relationships" xmlns:mc="http://schemas.openxmlformats.org/markup-compatibility/2006" xmlns:mv="urn:schemas-microsoft-com:mac:vml" xmlns:p="http://schemas.openxmlformats.org/presentationml/2006/main" xmlns:c="http://schemas.openxmlformats.org/drawingml/2006/chart" xmlns:dgm="http://schemas.openxmlformats.org/drawingml/2006/diagram" xmlns:o="urn:schemas-microsoft-com:office:office" xmlns:v="urn:schemas-microsoft-com:vml" xmlns:pvml="urn:schemas-microsoft-com:office:powerpoint" xmlns:com="http://schemas.openxmlformats.org/drawingml/2006/compatibility" xmlns:p14="http://schemas.microsoft.com/office/powerpoint/2010/main" xmlns:p15="http://schemas.microsoft.com/office/powerpoint/2012/main" xmlns:ahyp="http://schemas.microsoft.com/office/drawing/2018/hyperlinkcolor">
   <p:cSld>
     <p:bg>
       <p:bgPr>
@@ -8820,7 +9020,7 @@
 </file>
 
 <file path=ppt/slides/slide1.xml><?xml version="1.0" encoding="utf-8"?>
-<p:sld xmlns:a="http://schemas.openxmlformats.org/drawingml/2006/main" xmlns:r="http://schemas.openxmlformats.org/officeDocument/2006/relationships" xmlns:mc="http://schemas.openxmlformats.org/markup-compatibility/2006" xmlns:mv="urn:schemas-microsoft-com:mac:vml" xmlns:p="http://schemas.openxmlformats.org/presentationml/2006/main" xmlns:c="http://schemas.openxmlformats.org/drawingml/2006/chart" xmlns:dgm="http://schemas.openxmlformats.org/drawingml/2006/diagram" xmlns:o="urn:schemas-microsoft-com:office:office" xmlns:v="urn:schemas-microsoft-com:vml" xmlns:pvml="urn:schemas-microsoft-com:office:powerpoint" xmlns:com="http://schemas.openxmlformats.org/drawingml/2006/compatibility" xmlns:p14="http://schemas.microsoft.com/office/powerpoint/2010/main" xmlns:p15="http://schemas.microsoft.com/office/powerpoint/2012/main">
+<p:sld xmlns:a="http://schemas.openxmlformats.org/drawingml/2006/main" xmlns:r="http://schemas.openxmlformats.org/officeDocument/2006/relationships" xmlns:mc="http://schemas.openxmlformats.org/markup-compatibility/2006" xmlns:mv="urn:schemas-microsoft-com:mac:vml" xmlns:p="http://schemas.openxmlformats.org/presentationml/2006/main" xmlns:c="http://schemas.openxmlformats.org/drawingml/2006/chart" xmlns:dgm="http://schemas.openxmlformats.org/drawingml/2006/diagram" xmlns:o="urn:schemas-microsoft-com:office:office" xmlns:v="urn:schemas-microsoft-com:vml" xmlns:pvml="urn:schemas-microsoft-com:office:powerpoint" xmlns:com="http://schemas.openxmlformats.org/drawingml/2006/compatibility" xmlns:p14="http://schemas.microsoft.com/office/powerpoint/2010/main" xmlns:p15="http://schemas.microsoft.com/office/powerpoint/2012/main" xmlns:ahyp="http://schemas.microsoft.com/office/drawing/2018/hyperlinkcolor">
   <p:cSld>
     <p:spTree>
       <p:nvGrpSpPr>
@@ -9212,7 +9412,7 @@
 </file>
 
 <file path=ppt/slides/slide2.xml><?xml version="1.0" encoding="utf-8"?>
-<p:sld xmlns:a="http://schemas.openxmlformats.org/drawingml/2006/main" xmlns:r="http://schemas.openxmlformats.org/officeDocument/2006/relationships" xmlns:mc="http://schemas.openxmlformats.org/markup-compatibility/2006" xmlns:mv="urn:schemas-microsoft-com:mac:vml" xmlns:p="http://schemas.openxmlformats.org/presentationml/2006/main" xmlns:c="http://schemas.openxmlformats.org/drawingml/2006/chart" xmlns:dgm="http://schemas.openxmlformats.org/drawingml/2006/diagram" xmlns:o="urn:schemas-microsoft-com:office:office" xmlns:v="urn:schemas-microsoft-com:vml" xmlns:pvml="urn:schemas-microsoft-com:office:powerpoint" xmlns:com="http://schemas.openxmlformats.org/drawingml/2006/compatibility" xmlns:p14="http://schemas.microsoft.com/office/powerpoint/2010/main" xmlns:p15="http://schemas.microsoft.com/office/powerpoint/2012/main">
+<p:sld xmlns:a="http://schemas.openxmlformats.org/drawingml/2006/main" xmlns:r="http://schemas.openxmlformats.org/officeDocument/2006/relationships" xmlns:mc="http://schemas.openxmlformats.org/markup-compatibility/2006" xmlns:mv="urn:schemas-microsoft-com:mac:vml" xmlns:p="http://schemas.openxmlformats.org/presentationml/2006/main" xmlns:c="http://schemas.openxmlformats.org/drawingml/2006/chart" xmlns:dgm="http://schemas.openxmlformats.org/drawingml/2006/diagram" xmlns:o="urn:schemas-microsoft-com:office:office" xmlns:v="urn:schemas-microsoft-com:vml" xmlns:pvml="urn:schemas-microsoft-com:office:powerpoint" xmlns:com="http://schemas.openxmlformats.org/drawingml/2006/compatibility" xmlns:p14="http://schemas.microsoft.com/office/powerpoint/2010/main" xmlns:p15="http://schemas.microsoft.com/office/powerpoint/2012/main" xmlns:ahyp="http://schemas.microsoft.com/office/drawing/2018/hyperlinkcolor">
   <p:cSld>
     <p:spTree>
       <p:nvGrpSpPr>
@@ -9822,7 +10022,7 @@
 </file>
 
 <file path=ppt/slides/slide3.xml><?xml version="1.0" encoding="utf-8"?>
-<p:sld xmlns:a="http://schemas.openxmlformats.org/drawingml/2006/main" xmlns:r="http://schemas.openxmlformats.org/officeDocument/2006/relationships" xmlns:mc="http://schemas.openxmlformats.org/markup-compatibility/2006" xmlns:mv="urn:schemas-microsoft-com:mac:vml" xmlns:p="http://schemas.openxmlformats.org/presentationml/2006/main" xmlns:c="http://schemas.openxmlformats.org/drawingml/2006/chart" xmlns:dgm="http://schemas.openxmlformats.org/drawingml/2006/diagram" xmlns:o="urn:schemas-microsoft-com:office:office" xmlns:v="urn:schemas-microsoft-com:vml" xmlns:pvml="urn:schemas-microsoft-com:office:powerpoint" xmlns:com="http://schemas.openxmlformats.org/drawingml/2006/compatibility" xmlns:p14="http://schemas.microsoft.com/office/powerpoint/2010/main" xmlns:p15="http://schemas.microsoft.com/office/powerpoint/2012/main">
+<p:sld xmlns:a="http://schemas.openxmlformats.org/drawingml/2006/main" xmlns:r="http://schemas.openxmlformats.org/officeDocument/2006/relationships" xmlns:mc="http://schemas.openxmlformats.org/markup-compatibility/2006" xmlns:mv="urn:schemas-microsoft-com:mac:vml" xmlns:p="http://schemas.openxmlformats.org/presentationml/2006/main" xmlns:c="http://schemas.openxmlformats.org/drawingml/2006/chart" xmlns:dgm="http://schemas.openxmlformats.org/drawingml/2006/diagram" xmlns:o="urn:schemas-microsoft-com:office:office" xmlns:v="urn:schemas-microsoft-com:vml" xmlns:pvml="urn:schemas-microsoft-com:office:powerpoint" xmlns:com="http://schemas.openxmlformats.org/drawingml/2006/compatibility" xmlns:p14="http://schemas.microsoft.com/office/powerpoint/2010/main" xmlns:p15="http://schemas.microsoft.com/office/powerpoint/2012/main" xmlns:ahyp="http://schemas.microsoft.com/office/drawing/2018/hyperlinkcolor">
   <p:cSld>
     <p:spTree>
       <p:nvGrpSpPr>
@@ -10245,7 +10445,7 @@
 </file>
 
 <file path=ppt/slides/slide4.xml><?xml version="1.0" encoding="utf-8"?>
-<p:sld xmlns:a="http://schemas.openxmlformats.org/drawingml/2006/main" xmlns:r="http://schemas.openxmlformats.org/officeDocument/2006/relationships" xmlns:mc="http://schemas.openxmlformats.org/markup-compatibility/2006" xmlns:mv="urn:schemas-microsoft-com:mac:vml" xmlns:p="http://schemas.openxmlformats.org/presentationml/2006/main" xmlns:c="http://schemas.openxmlformats.org/drawingml/2006/chart" xmlns:dgm="http://schemas.openxmlformats.org/drawingml/2006/diagram" xmlns:o="urn:schemas-microsoft-com:office:office" xmlns:v="urn:schemas-microsoft-com:vml" xmlns:pvml="urn:schemas-microsoft-com:office:powerpoint" xmlns:com="http://schemas.openxmlformats.org/drawingml/2006/compatibility" xmlns:p14="http://schemas.microsoft.com/office/powerpoint/2010/main" xmlns:p15="http://schemas.microsoft.com/office/powerpoint/2012/main">
+<p:sld xmlns:a="http://schemas.openxmlformats.org/drawingml/2006/main" xmlns:r="http://schemas.openxmlformats.org/officeDocument/2006/relationships" xmlns:mc="http://schemas.openxmlformats.org/markup-compatibility/2006" xmlns:mv="urn:schemas-microsoft-com:mac:vml" xmlns:p="http://schemas.openxmlformats.org/presentationml/2006/main" xmlns:c="http://schemas.openxmlformats.org/drawingml/2006/chart" xmlns:dgm="http://schemas.openxmlformats.org/drawingml/2006/diagram" xmlns:o="urn:schemas-microsoft-com:office:office" xmlns:v="urn:schemas-microsoft-com:vml" xmlns:pvml="urn:schemas-microsoft-com:office:powerpoint" xmlns:com="http://schemas.openxmlformats.org/drawingml/2006/compatibility" xmlns:p14="http://schemas.microsoft.com/office/powerpoint/2010/main" xmlns:p15="http://schemas.microsoft.com/office/powerpoint/2012/main" xmlns:ahyp="http://schemas.microsoft.com/office/drawing/2018/hyperlinkcolor">
   <p:cSld>
     <p:spTree>
       <p:nvGrpSpPr>
@@ -10535,7 +10735,23 @@
                   <a:schemeClr val="dk1"/>
                 </a:solidFill>
               </a:rPr>
-              <a:t> tells us exactly where a file or folder is. We could have an “All Users” folder inside every folder you see on the right (except WUTemp</a:t>
+              <a:t>, aka. </a:t>
+            </a:r>
+            <a:r>
+              <a:rPr b="1" lang="en-US" sz="2400">
+                <a:solidFill>
+                  <a:schemeClr val="dk1"/>
+                </a:solidFill>
+              </a:rPr>
+              <a:t>full path</a:t>
+            </a:r>
+            <a:r>
+              <a:rPr lang="en-US" sz="2400">
+                <a:solidFill>
+                  <a:schemeClr val="dk1"/>
+                </a:solidFill>
+              </a:rPr>
+              <a:t>, tells us exactly where a file or folder is. We could have an “All Users” folder inside every folder you see on the right (except Downloads or WUTemp</a:t>
             </a:r>
             <a:r>
               <a:rPr lang="en-US" sz="2400">
@@ -10566,7 +10782,7 @@
                   <a:schemeClr val="dk1"/>
                 </a:solidFill>
               </a:rPr>
-              <a:t>C:\Documents and Settings\AllUsers</a:t>
+              <a:t>C:\Documents and Settings\AllUsers\</a:t>
             </a:r>
             <a:br>
               <a:rPr b="1" lang="en-US" sz="2000">
@@ -10608,7 +10824,7 @@
                   <a:schemeClr val="dk1"/>
                 </a:solidFill>
               </a:rPr>
-              <a:t>How many directories does the </a:t>
+              <a:t>(How many directories does the </a:t>
             </a:r>
             <a:r>
               <a:rPr lang="en-US" sz="2400">
@@ -10624,50 +10840,7 @@
                   <a:schemeClr val="dk1"/>
                 </a:solidFill>
               </a:rPr>
-              <a:t>contains?</a:t>
-            </a:r>
-            <a:endParaRPr sz="2400">
-              <a:solidFill>
-                <a:schemeClr val="dk1"/>
-              </a:solidFill>
-            </a:endParaRPr>
-          </a:p>
-          <a:p>
-            <a:pPr indent="0" lvl="0" marL="0" marR="0" rtl="0" algn="l">
-              <a:lnSpc>
-                <a:spcPct val="90000"/>
-              </a:lnSpc>
-              <a:spcBef>
-                <a:spcPts val="1417"/>
-              </a:spcBef>
-              <a:spcAft>
-                <a:spcPts val="0"/>
-              </a:spcAft>
-              <a:buNone/>
-            </a:pPr>
-            <a:r>
-              <a:rPr lang="en-US" sz="2400">
-                <a:solidFill>
-                  <a:schemeClr val="dk1"/>
-                </a:solidFill>
-              </a:rPr>
-              <a:t>In Windows, all </a:t>
-            </a:r>
-            <a:r>
-              <a:rPr b="1" lang="en-US" sz="2400">
-                <a:solidFill>
-                  <a:schemeClr val="dk1"/>
-                </a:solidFill>
-              </a:rPr>
-              <a:t>absolute path</a:t>
-            </a:r>
-            <a:r>
-              <a:rPr lang="en-US" sz="2400">
-                <a:solidFill>
-                  <a:schemeClr val="dk1"/>
-                </a:solidFill>
-              </a:rPr>
-              <a:t>s start with a drive letter, followed by a colon, :</a:t>
+              <a:t>contains?)</a:t>
             </a:r>
             <a:endParaRPr sz="2400">
               <a:solidFill>
@@ -10714,7 +10887,7 @@
 </file>
 
 <file path=ppt/slides/slide5.xml><?xml version="1.0" encoding="utf-8"?>
-<p:sld xmlns:a="http://schemas.openxmlformats.org/drawingml/2006/main" xmlns:r="http://schemas.openxmlformats.org/officeDocument/2006/relationships" xmlns:mc="http://schemas.openxmlformats.org/markup-compatibility/2006" xmlns:mv="urn:schemas-microsoft-com:mac:vml" xmlns:p="http://schemas.openxmlformats.org/presentationml/2006/main" xmlns:c="http://schemas.openxmlformats.org/drawingml/2006/chart" xmlns:dgm="http://schemas.openxmlformats.org/drawingml/2006/diagram" xmlns:o="urn:schemas-microsoft-com:office:office" xmlns:v="urn:schemas-microsoft-com:vml" xmlns:pvml="urn:schemas-microsoft-com:office:powerpoint" xmlns:com="http://schemas.openxmlformats.org/drawingml/2006/compatibility" xmlns:p14="http://schemas.microsoft.com/office/powerpoint/2010/main" xmlns:p15="http://schemas.microsoft.com/office/powerpoint/2012/main">
+<p:sld xmlns:a="http://schemas.openxmlformats.org/drawingml/2006/main" xmlns:r="http://schemas.openxmlformats.org/officeDocument/2006/relationships" xmlns:mc="http://schemas.openxmlformats.org/markup-compatibility/2006" xmlns:mv="urn:schemas-microsoft-com:mac:vml" xmlns:p="http://schemas.openxmlformats.org/presentationml/2006/main" xmlns:c="http://schemas.openxmlformats.org/drawingml/2006/chart" xmlns:dgm="http://schemas.openxmlformats.org/drawingml/2006/diagram" xmlns:o="urn:schemas-microsoft-com:office:office" xmlns:v="urn:schemas-microsoft-com:vml" xmlns:pvml="urn:schemas-microsoft-com:office:powerpoint" xmlns:com="http://schemas.openxmlformats.org/drawingml/2006/compatibility" xmlns:p14="http://schemas.microsoft.com/office/powerpoint/2010/main" xmlns:p15="http://schemas.microsoft.com/office/powerpoint/2012/main" xmlns:ahyp="http://schemas.microsoft.com/office/drawing/2018/hyperlinkcolor">
   <p:cSld>
     <p:spTree>
       <p:nvGrpSpPr>
@@ -10948,6 +11121,1268 @@
       <p:sp>
         <p:nvSpPr>
           <p:cNvPr id="102" name="Google Shape;102;p18"/>
+          <p:cNvSpPr/>
+          <p:nvPr/>
+        </p:nvSpPr>
+        <p:spPr>
+          <a:xfrm>
+            <a:off x="503650" y="1165075"/>
+            <a:ext cx="4620000" cy="4446600"/>
+          </a:xfrm>
+          <a:prstGeom prst="rect">
+            <a:avLst/>
+          </a:prstGeom>
+          <a:noFill/>
+          <a:ln>
+            <a:noFill/>
+          </a:ln>
+        </p:spPr>
+        <p:txBody>
+          <a:bodyPr anchorCtr="0" anchor="t" bIns="0" lIns="0" spcFirstLastPara="1" rIns="0" wrap="square" tIns="0">
+            <a:noAutofit/>
+          </a:bodyPr>
+          <a:lstStyle/>
+          <a:p>
+            <a:pPr indent="0" lvl="0" marL="0" rtl="0" algn="l">
+              <a:lnSpc>
+                <a:spcPct val="90000"/>
+              </a:lnSpc>
+              <a:spcBef>
+                <a:spcPts val="1417"/>
+              </a:spcBef>
+              <a:spcAft>
+                <a:spcPts val="0"/>
+              </a:spcAft>
+              <a:buClr>
+                <a:schemeClr val="dk1"/>
+              </a:buClr>
+              <a:buSzPts val="1100"/>
+              <a:buFont typeface="Arial"/>
+              <a:buNone/>
+            </a:pPr>
+            <a:r>
+              <a:rPr lang="en-US" sz="2400">
+                <a:solidFill>
+                  <a:schemeClr val="dk1"/>
+                </a:solidFill>
+              </a:rPr>
+              <a:t>In Windows, all </a:t>
+            </a:r>
+            <a:r>
+              <a:rPr b="1" lang="en-US" sz="2400">
+                <a:solidFill>
+                  <a:schemeClr val="dk1"/>
+                </a:solidFill>
+              </a:rPr>
+              <a:t>absolute path</a:t>
+            </a:r>
+            <a:r>
+              <a:rPr lang="en-US" sz="2400">
+                <a:solidFill>
+                  <a:schemeClr val="dk1"/>
+                </a:solidFill>
+              </a:rPr>
+              <a:t>s start with a drive letter, followed by a colon, e.g. F:\</a:t>
+            </a:r>
+            <a:endParaRPr sz="2400">
+              <a:solidFill>
+                <a:schemeClr val="dk1"/>
+              </a:solidFill>
+            </a:endParaRPr>
+          </a:p>
+          <a:p>
+            <a:pPr indent="0" lvl="0" marL="0" marR="0" rtl="0" algn="l">
+              <a:lnSpc>
+                <a:spcPct val="100000"/>
+              </a:lnSpc>
+              <a:spcBef>
+                <a:spcPts val="1400"/>
+              </a:spcBef>
+              <a:spcAft>
+                <a:spcPts val="0"/>
+              </a:spcAft>
+              <a:buNone/>
+            </a:pPr>
+            <a:r>
+              <a:rPr lang="en-US" sz="2400">
+                <a:solidFill>
+                  <a:schemeClr val="dk1"/>
+                </a:solidFill>
+              </a:rPr>
+              <a:t>Often, the last backslash is omitted, but then you wouldn’t know if it’s a file.</a:t>
+            </a:r>
+            <a:br>
+              <a:rPr lang="en-US" sz="2400">
+                <a:solidFill>
+                  <a:schemeClr val="dk1"/>
+                </a:solidFill>
+              </a:rPr>
+            </a:br>
+            <a:r>
+              <a:rPr b="1" lang="en-US" sz="2000">
+                <a:solidFill>
+                  <a:schemeClr val="dk1"/>
+                </a:solidFill>
+              </a:rPr>
+              <a:t>C:\Documents and Settings\AllUsers</a:t>
+            </a:r>
+            <a:endParaRPr sz="2400">
+              <a:solidFill>
+                <a:schemeClr val="dk1"/>
+              </a:solidFill>
+            </a:endParaRPr>
+          </a:p>
+        </p:txBody>
+      </p:sp>
+      <p:pic>
+        <p:nvPicPr>
+          <p:cNvPr id="103" name="Google Shape;103;p18"/>
+          <p:cNvPicPr preferRelativeResize="0"/>
+          <p:nvPr/>
+        </p:nvPicPr>
+        <p:blipFill>
+          <a:blip r:embed="rId3">
+            <a:alphaModFix/>
+          </a:blip>
+          <a:stretch>
+            <a:fillRect/>
+          </a:stretch>
+        </p:blipFill>
+        <p:spPr>
+          <a:xfrm>
+            <a:off x="5298287" y="1165075"/>
+            <a:ext cx="4782337" cy="4446725"/>
+          </a:xfrm>
+          <a:prstGeom prst="rect">
+            <a:avLst/>
+          </a:prstGeom>
+          <a:noFill/>
+          <a:ln>
+            <a:noFill/>
+          </a:ln>
+        </p:spPr>
+      </p:pic>
+    </p:spTree>
+  </p:cSld>
+  <p:clrMapOvr>
+    <a:masterClrMapping/>
+  </p:clrMapOvr>
+</p:sld>
+</file>
+
+<file path=ppt/slides/slide6.xml><?xml version="1.0" encoding="utf-8"?>
+<p:sld xmlns:a="http://schemas.openxmlformats.org/drawingml/2006/main" xmlns:r="http://schemas.openxmlformats.org/officeDocument/2006/relationships" xmlns:mc="http://schemas.openxmlformats.org/markup-compatibility/2006" xmlns:mv="urn:schemas-microsoft-com:mac:vml" xmlns:p="http://schemas.openxmlformats.org/presentationml/2006/main" xmlns:c="http://schemas.openxmlformats.org/drawingml/2006/chart" xmlns:dgm="http://schemas.openxmlformats.org/drawingml/2006/diagram" xmlns:o="urn:schemas-microsoft-com:office:office" xmlns:v="urn:schemas-microsoft-com:vml" xmlns:pvml="urn:schemas-microsoft-com:office:powerpoint" xmlns:com="http://schemas.openxmlformats.org/drawingml/2006/compatibility" xmlns:p14="http://schemas.microsoft.com/office/powerpoint/2010/main" xmlns:p15="http://schemas.microsoft.com/office/powerpoint/2012/main" xmlns:ahyp="http://schemas.microsoft.com/office/drawing/2018/hyperlinkcolor">
+  <p:cSld>
+    <p:spTree>
+      <p:nvGrpSpPr>
+        <p:cNvPr id="107" name="Shape 107"/>
+        <p:cNvGrpSpPr/>
+        <p:nvPr/>
+      </p:nvGrpSpPr>
+      <p:grpSpPr>
+        <a:xfrm>
+          <a:off x="0" y="0"/>
+          <a:ext cx="0" cy="0"/>
+          <a:chOff x="0" y="0"/>
+          <a:chExt cx="0" cy="0"/>
+        </a:xfrm>
+      </p:grpSpPr>
+      <p:sp>
+        <p:nvSpPr>
+          <p:cNvPr id="108" name="Google Shape;108;p19"/>
+          <p:cNvSpPr/>
+          <p:nvPr/>
+        </p:nvSpPr>
+        <p:spPr>
+          <a:xfrm>
+            <a:off x="503640" y="226080"/>
+            <a:ext cx="9063000" cy="939000"/>
+          </a:xfrm>
+          <a:prstGeom prst="rect">
+            <a:avLst/>
+          </a:prstGeom>
+          <a:noFill/>
+          <a:ln>
+            <a:noFill/>
+          </a:ln>
+        </p:spPr>
+        <p:txBody>
+          <a:bodyPr anchorCtr="0" anchor="ctr" bIns="0" lIns="0" spcFirstLastPara="1" rIns="0" wrap="square" tIns="0">
+            <a:noAutofit/>
+          </a:bodyPr>
+          <a:lstStyle/>
+          <a:p>
+            <a:pPr indent="0" lvl="0" marL="0" marR="0" rtl="0" algn="ctr">
+              <a:lnSpc>
+                <a:spcPct val="100000"/>
+              </a:lnSpc>
+              <a:spcBef>
+                <a:spcPts val="0"/>
+              </a:spcBef>
+              <a:spcAft>
+                <a:spcPts val="0"/>
+              </a:spcAft>
+              <a:buNone/>
+            </a:pPr>
+            <a:r>
+              <a:rPr b="1" i="1" lang="en-US" sz="4000" strike="noStrike">
+                <a:solidFill>
+                  <a:srgbClr val="000000"/>
+                </a:solidFill>
+                <a:latin typeface="Arial"/>
+                <a:ea typeface="Arial"/>
+                <a:cs typeface="Arial"/>
+                <a:sym typeface="Arial"/>
+              </a:rPr>
+              <a:t>Objective: Navigating a File System</a:t>
+            </a:r>
+            <a:endParaRPr b="0" sz="4000" strike="noStrike">
+              <a:solidFill>
+                <a:schemeClr val="dk1"/>
+              </a:solidFill>
+              <a:latin typeface="Arial"/>
+              <a:ea typeface="Arial"/>
+              <a:cs typeface="Arial"/>
+              <a:sym typeface="Arial"/>
+            </a:endParaRPr>
+          </a:p>
+        </p:txBody>
+      </p:sp>
+      <p:sp>
+        <p:nvSpPr>
+          <p:cNvPr id="109" name="Google Shape;109;p19"/>
+          <p:cNvSpPr/>
+          <p:nvPr/>
+        </p:nvSpPr>
+        <p:spPr>
+          <a:xfrm>
+            <a:off x="457200" y="1554480"/>
+            <a:ext cx="9063000" cy="3837900"/>
+          </a:xfrm>
+          <a:prstGeom prst="rect">
+            <a:avLst/>
+          </a:prstGeom>
+          <a:noFill/>
+          <a:ln>
+            <a:noFill/>
+          </a:ln>
+        </p:spPr>
+        <p:txBody>
+          <a:bodyPr anchorCtr="0" anchor="ctr" bIns="91425" lIns="91425" spcFirstLastPara="1" rIns="91425" wrap="square" tIns="91425">
+            <a:noAutofit/>
+          </a:bodyPr>
+          <a:lstStyle/>
+          <a:p>
+            <a:pPr indent="0" lvl="0" marL="0" rtl="0" algn="l">
+              <a:spcBef>
+                <a:spcPts val="0"/>
+              </a:spcBef>
+              <a:spcAft>
+                <a:spcPts val="0"/>
+              </a:spcAft>
+              <a:buNone/>
+            </a:pPr>
+            <a:r>
+              <a:t/>
+            </a:r>
+            <a:endParaRPr/>
+          </a:p>
+        </p:txBody>
+      </p:sp>
+      <p:sp>
+        <p:nvSpPr>
+          <p:cNvPr id="110" name="Google Shape;110;p19"/>
+          <p:cNvSpPr/>
+          <p:nvPr/>
+        </p:nvSpPr>
+        <p:spPr>
+          <a:xfrm>
+            <a:off x="504000" y="1326600"/>
+            <a:ext cx="9070800" cy="3287400"/>
+          </a:xfrm>
+          <a:prstGeom prst="rect">
+            <a:avLst/>
+          </a:prstGeom>
+          <a:noFill/>
+          <a:ln>
+            <a:noFill/>
+          </a:ln>
+        </p:spPr>
+        <p:txBody>
+          <a:bodyPr anchorCtr="0" anchor="t" bIns="0" lIns="0" spcFirstLastPara="1" rIns="0" wrap="square" tIns="0">
+            <a:noAutofit/>
+          </a:bodyPr>
+          <a:lstStyle/>
+          <a:p>
+            <a:pPr indent="0" lvl="0" marL="0" marR="0" rtl="0" algn="l">
+              <a:lnSpc>
+                <a:spcPct val="100000"/>
+              </a:lnSpc>
+              <a:spcBef>
+                <a:spcPts val="0"/>
+              </a:spcBef>
+              <a:spcAft>
+                <a:spcPts val="0"/>
+              </a:spcAft>
+              <a:buNone/>
+            </a:pPr>
+            <a:r>
+              <a:t/>
+            </a:r>
+            <a:endParaRPr b="0" sz="1800" strike="noStrike">
+              <a:solidFill>
+                <a:schemeClr val="dk1"/>
+              </a:solidFill>
+              <a:latin typeface="Arial"/>
+              <a:ea typeface="Arial"/>
+              <a:cs typeface="Arial"/>
+              <a:sym typeface="Arial"/>
+            </a:endParaRPr>
+          </a:p>
+          <a:p>
+            <a:pPr indent="0" lvl="0" marL="0" marR="0" rtl="0" algn="l">
+              <a:lnSpc>
+                <a:spcPct val="100000"/>
+              </a:lnSpc>
+              <a:spcBef>
+                <a:spcPts val="0"/>
+              </a:spcBef>
+              <a:spcAft>
+                <a:spcPts val="0"/>
+              </a:spcAft>
+              <a:buNone/>
+            </a:pPr>
+            <a:r>
+              <a:rPr b="0" lang="en-US" sz="3600" strike="noStrike">
+                <a:solidFill>
+                  <a:srgbClr val="000000"/>
+                </a:solidFill>
+                <a:latin typeface="Arial"/>
+                <a:ea typeface="Arial"/>
+                <a:cs typeface="Arial"/>
+                <a:sym typeface="Arial"/>
+              </a:rPr>
+              <a:t> </a:t>
+            </a:r>
+            <a:endParaRPr b="0" sz="3600" strike="noStrike">
+              <a:solidFill>
+                <a:schemeClr val="dk1"/>
+              </a:solidFill>
+              <a:latin typeface="Arial"/>
+              <a:ea typeface="Arial"/>
+              <a:cs typeface="Arial"/>
+              <a:sym typeface="Arial"/>
+            </a:endParaRPr>
+          </a:p>
+          <a:p>
+            <a:pPr indent="0" lvl="0" marL="0" marR="0" rtl="0" algn="l">
+              <a:lnSpc>
+                <a:spcPct val="100000"/>
+              </a:lnSpc>
+              <a:spcBef>
+                <a:spcPts val="0"/>
+              </a:spcBef>
+              <a:spcAft>
+                <a:spcPts val="0"/>
+              </a:spcAft>
+              <a:buNone/>
+            </a:pPr>
+            <a:r>
+              <a:t/>
+            </a:r>
+            <a:endParaRPr b="0" sz="3600" strike="noStrike">
+              <a:solidFill>
+                <a:schemeClr val="dk1"/>
+              </a:solidFill>
+              <a:latin typeface="Arial"/>
+              <a:ea typeface="Arial"/>
+              <a:cs typeface="Arial"/>
+              <a:sym typeface="Arial"/>
+            </a:endParaRPr>
+          </a:p>
+        </p:txBody>
+      </p:sp>
+      <p:sp>
+        <p:nvSpPr>
+          <p:cNvPr id="111" name="Google Shape;111;p19"/>
+          <p:cNvSpPr/>
+          <p:nvPr/>
+        </p:nvSpPr>
+        <p:spPr>
+          <a:xfrm>
+            <a:off x="503650" y="1165075"/>
+            <a:ext cx="9063000" cy="4105800"/>
+          </a:xfrm>
+          <a:prstGeom prst="rect">
+            <a:avLst/>
+          </a:prstGeom>
+          <a:noFill/>
+          <a:ln>
+            <a:noFill/>
+          </a:ln>
+        </p:spPr>
+        <p:txBody>
+          <a:bodyPr anchorCtr="0" anchor="t" bIns="0" lIns="0" spcFirstLastPara="1" rIns="0" wrap="square" tIns="0">
+            <a:noAutofit/>
+          </a:bodyPr>
+          <a:lstStyle/>
+          <a:p>
+            <a:pPr indent="0" lvl="0" marL="0" marR="0" rtl="0" algn="l">
+              <a:lnSpc>
+                <a:spcPct val="90000"/>
+              </a:lnSpc>
+              <a:spcBef>
+                <a:spcPts val="1000"/>
+              </a:spcBef>
+              <a:spcAft>
+                <a:spcPts val="0"/>
+              </a:spcAft>
+              <a:buNone/>
+            </a:pPr>
+            <a:r>
+              <a:rPr lang="en-US" sz="2400">
+                <a:solidFill>
+                  <a:schemeClr val="dk1"/>
+                </a:solidFill>
+              </a:rPr>
+              <a:t>From here, we’ll say directory in</a:t>
+            </a:r>
+            <a:br>
+              <a:rPr lang="en-US" sz="2400">
+                <a:solidFill>
+                  <a:schemeClr val="dk1"/>
+                </a:solidFill>
+              </a:rPr>
+            </a:br>
+            <a:r>
+              <a:rPr lang="en-US" sz="2400">
+                <a:solidFill>
+                  <a:schemeClr val="dk1"/>
+                </a:solidFill>
+              </a:rPr>
+              <a:t>stead of folder.</a:t>
+            </a:r>
+            <a:endParaRPr sz="2400">
+              <a:solidFill>
+                <a:schemeClr val="dk1"/>
+              </a:solidFill>
+            </a:endParaRPr>
+          </a:p>
+          <a:p>
+            <a:pPr indent="0" lvl="0" marL="0" marR="0" rtl="0" algn="l">
+              <a:lnSpc>
+                <a:spcPct val="90000"/>
+              </a:lnSpc>
+              <a:spcBef>
+                <a:spcPts val="1000"/>
+              </a:spcBef>
+              <a:spcAft>
+                <a:spcPts val="0"/>
+              </a:spcAft>
+              <a:buNone/>
+            </a:pPr>
+            <a:r>
+              <a:rPr lang="en-US" sz="2400">
+                <a:solidFill>
+                  <a:schemeClr val="dk1"/>
+                </a:solidFill>
+              </a:rPr>
+              <a:t>File trees are mostly drawn this</a:t>
+            </a:r>
+            <a:br>
+              <a:rPr lang="en-US" sz="2400">
+                <a:solidFill>
+                  <a:schemeClr val="dk1"/>
+                </a:solidFill>
+              </a:rPr>
+            </a:br>
+            <a:r>
+              <a:rPr lang="en-US" sz="2400">
+                <a:solidFill>
+                  <a:schemeClr val="dk1"/>
+                </a:solidFill>
+              </a:rPr>
+              <a:t>way, with the root directory on</a:t>
+            </a:r>
+            <a:br>
+              <a:rPr lang="en-US" sz="2400">
+                <a:solidFill>
+                  <a:schemeClr val="dk1"/>
+                </a:solidFill>
+              </a:rPr>
+            </a:br>
+            <a:r>
+              <a:rPr lang="en-US" sz="2400">
+                <a:solidFill>
+                  <a:schemeClr val="dk1"/>
+                </a:solidFill>
+              </a:rPr>
+              <a:t>top. Here, we see C:\ has at</a:t>
+            </a:r>
+            <a:br>
+              <a:rPr lang="en-US" sz="2400">
+                <a:solidFill>
+                  <a:schemeClr val="dk1"/>
+                </a:solidFill>
+              </a:rPr>
+            </a:br>
+            <a:r>
+              <a:rPr lang="en-US" sz="2400">
+                <a:solidFill>
+                  <a:schemeClr val="dk1"/>
+                </a:solidFill>
+              </a:rPr>
+              <a:t>least 3 subdirectories &amp; 1 file.</a:t>
+            </a:r>
+            <a:endParaRPr sz="2400">
+              <a:solidFill>
+                <a:schemeClr val="dk1"/>
+              </a:solidFill>
+            </a:endParaRPr>
+          </a:p>
+          <a:p>
+            <a:pPr indent="0" lvl="0" marL="0" marR="0" rtl="0" algn="l">
+              <a:lnSpc>
+                <a:spcPct val="90000"/>
+              </a:lnSpc>
+              <a:spcBef>
+                <a:spcPts val="1000"/>
+              </a:spcBef>
+              <a:spcAft>
+                <a:spcPts val="0"/>
+              </a:spcAft>
+              <a:buNone/>
+            </a:pPr>
+            <a:r>
+              <a:rPr lang="en-US" sz="2400">
+                <a:solidFill>
+                  <a:schemeClr val="dk1"/>
+                </a:solidFill>
+              </a:rPr>
+              <a:t>We say Accessories is a</a:t>
+            </a:r>
+            <a:br>
+              <a:rPr lang="en-US" sz="2400">
+                <a:solidFill>
+                  <a:schemeClr val="dk1"/>
+                </a:solidFill>
+              </a:rPr>
+            </a:br>
+            <a:r>
+              <a:rPr b="1" lang="en-US" sz="2400">
+                <a:solidFill>
+                  <a:schemeClr val="dk1"/>
+                </a:solidFill>
+              </a:rPr>
+              <a:t>subdirectory </a:t>
+            </a:r>
+            <a:r>
+              <a:rPr lang="en-US" sz="2400">
+                <a:solidFill>
+                  <a:schemeClr val="dk1"/>
+                </a:solidFill>
+              </a:rPr>
+              <a:t>of Program Files,</a:t>
+            </a:r>
+            <a:br>
+              <a:rPr lang="en-US" sz="2400">
+                <a:solidFill>
+                  <a:schemeClr val="dk1"/>
+                </a:solidFill>
+              </a:rPr>
+            </a:br>
+            <a:r>
+              <a:rPr lang="en-US" sz="2400">
+                <a:solidFill>
+                  <a:schemeClr val="dk1"/>
+                </a:solidFill>
+              </a:rPr>
+              <a:t>which means Accessories is a</a:t>
+            </a:r>
+            <a:br>
+              <a:rPr lang="en-US" sz="2400">
+                <a:solidFill>
+                  <a:schemeClr val="dk1"/>
+                </a:solidFill>
+              </a:rPr>
+            </a:br>
+            <a:r>
+              <a:rPr lang="en-US" sz="2400">
+                <a:solidFill>
+                  <a:schemeClr val="dk1"/>
+                </a:solidFill>
+              </a:rPr>
+              <a:t>directory inside Program Files. That makes Program Files the </a:t>
+            </a:r>
+            <a:r>
+              <a:rPr b="1" lang="en-US" sz="2400">
+                <a:solidFill>
+                  <a:schemeClr val="dk1"/>
+                </a:solidFill>
+              </a:rPr>
+              <a:t>parent directory</a:t>
+            </a:r>
+            <a:r>
+              <a:rPr lang="en-US" sz="2400">
+                <a:solidFill>
+                  <a:schemeClr val="dk1"/>
+                </a:solidFill>
+              </a:rPr>
+              <a:t> of Accessories. Thus, a file cannot be a parent.</a:t>
+            </a:r>
+            <a:endParaRPr sz="2400">
+              <a:solidFill>
+                <a:schemeClr val="dk1"/>
+              </a:solidFill>
+            </a:endParaRPr>
+          </a:p>
+        </p:txBody>
+      </p:sp>
+      <p:pic>
+        <p:nvPicPr>
+          <p:cNvPr id="112" name="Google Shape;112;p19"/>
+          <p:cNvPicPr preferRelativeResize="0"/>
+          <p:nvPr/>
+        </p:nvPicPr>
+        <p:blipFill>
+          <a:blip r:embed="rId3">
+            <a:alphaModFix/>
+          </a:blip>
+          <a:stretch>
+            <a:fillRect/>
+          </a:stretch>
+        </p:blipFill>
+        <p:spPr>
+          <a:xfrm>
+            <a:off x="4854972" y="1165075"/>
+            <a:ext cx="4711678" cy="3287400"/>
+          </a:xfrm>
+          <a:prstGeom prst="rect">
+            <a:avLst/>
+          </a:prstGeom>
+          <a:noFill/>
+          <a:ln>
+            <a:noFill/>
+          </a:ln>
+        </p:spPr>
+      </p:pic>
+    </p:spTree>
+  </p:cSld>
+  <p:clrMapOvr>
+    <a:masterClrMapping/>
+  </p:clrMapOvr>
+</p:sld>
+</file>
+
+<file path=ppt/slides/slide7.xml><?xml version="1.0" encoding="utf-8"?>
+<p:sld xmlns:a="http://schemas.openxmlformats.org/drawingml/2006/main" xmlns:r="http://schemas.openxmlformats.org/officeDocument/2006/relationships" xmlns:mc="http://schemas.openxmlformats.org/markup-compatibility/2006" xmlns:mv="urn:schemas-microsoft-com:mac:vml" xmlns:p="http://schemas.openxmlformats.org/presentationml/2006/main" xmlns:c="http://schemas.openxmlformats.org/drawingml/2006/chart" xmlns:dgm="http://schemas.openxmlformats.org/drawingml/2006/diagram" xmlns:o="urn:schemas-microsoft-com:office:office" xmlns:v="urn:schemas-microsoft-com:vml" xmlns:pvml="urn:schemas-microsoft-com:office:powerpoint" xmlns:com="http://schemas.openxmlformats.org/drawingml/2006/compatibility" xmlns:p14="http://schemas.microsoft.com/office/powerpoint/2010/main" xmlns:p15="http://schemas.microsoft.com/office/powerpoint/2012/main" xmlns:ahyp="http://schemas.microsoft.com/office/drawing/2018/hyperlinkcolor">
+  <p:cSld>
+    <p:spTree>
+      <p:nvGrpSpPr>
+        <p:cNvPr id="116" name="Shape 116"/>
+        <p:cNvGrpSpPr/>
+        <p:nvPr/>
+      </p:nvGrpSpPr>
+      <p:grpSpPr>
+        <a:xfrm>
+          <a:off x="0" y="0"/>
+          <a:ext cx="0" cy="0"/>
+          <a:chOff x="0" y="0"/>
+          <a:chExt cx="0" cy="0"/>
+        </a:xfrm>
+      </p:grpSpPr>
+      <p:sp>
+        <p:nvSpPr>
+          <p:cNvPr id="117" name="Google Shape;117;p20"/>
+          <p:cNvSpPr/>
+          <p:nvPr/>
+        </p:nvSpPr>
+        <p:spPr>
+          <a:xfrm>
+            <a:off x="503640" y="226080"/>
+            <a:ext cx="9063000" cy="939000"/>
+          </a:xfrm>
+          <a:prstGeom prst="rect">
+            <a:avLst/>
+          </a:prstGeom>
+          <a:noFill/>
+          <a:ln>
+            <a:noFill/>
+          </a:ln>
+        </p:spPr>
+        <p:txBody>
+          <a:bodyPr anchorCtr="0" anchor="ctr" bIns="0" lIns="0" spcFirstLastPara="1" rIns="0" wrap="square" tIns="0">
+            <a:noAutofit/>
+          </a:bodyPr>
+          <a:lstStyle/>
+          <a:p>
+            <a:pPr indent="0" lvl="0" marL="0" marR="0" rtl="0" algn="ctr">
+              <a:lnSpc>
+                <a:spcPct val="100000"/>
+              </a:lnSpc>
+              <a:spcBef>
+                <a:spcPts val="0"/>
+              </a:spcBef>
+              <a:spcAft>
+                <a:spcPts val="0"/>
+              </a:spcAft>
+              <a:buNone/>
+            </a:pPr>
+            <a:r>
+              <a:rPr b="1" i="1" lang="en-US" sz="4000" strike="noStrike">
+                <a:solidFill>
+                  <a:srgbClr val="000000"/>
+                </a:solidFill>
+                <a:latin typeface="Arial"/>
+                <a:ea typeface="Arial"/>
+                <a:cs typeface="Arial"/>
+                <a:sym typeface="Arial"/>
+              </a:rPr>
+              <a:t>Objective: Navigating a File System</a:t>
+            </a:r>
+            <a:endParaRPr b="0" sz="4000" strike="noStrike">
+              <a:solidFill>
+                <a:schemeClr val="dk1"/>
+              </a:solidFill>
+              <a:latin typeface="Arial"/>
+              <a:ea typeface="Arial"/>
+              <a:cs typeface="Arial"/>
+              <a:sym typeface="Arial"/>
+            </a:endParaRPr>
+          </a:p>
+        </p:txBody>
+      </p:sp>
+      <p:sp>
+        <p:nvSpPr>
+          <p:cNvPr id="118" name="Google Shape;118;p20"/>
+          <p:cNvSpPr/>
+          <p:nvPr/>
+        </p:nvSpPr>
+        <p:spPr>
+          <a:xfrm>
+            <a:off x="457200" y="1554480"/>
+            <a:ext cx="9063000" cy="3837900"/>
+          </a:xfrm>
+          <a:prstGeom prst="rect">
+            <a:avLst/>
+          </a:prstGeom>
+          <a:noFill/>
+          <a:ln>
+            <a:noFill/>
+          </a:ln>
+        </p:spPr>
+        <p:txBody>
+          <a:bodyPr anchorCtr="0" anchor="ctr" bIns="91425" lIns="91425" spcFirstLastPara="1" rIns="91425" wrap="square" tIns="91425">
+            <a:noAutofit/>
+          </a:bodyPr>
+          <a:lstStyle/>
+          <a:p>
+            <a:pPr indent="0" lvl="0" marL="0" rtl="0" algn="l">
+              <a:spcBef>
+                <a:spcPts val="0"/>
+              </a:spcBef>
+              <a:spcAft>
+                <a:spcPts val="0"/>
+              </a:spcAft>
+              <a:buNone/>
+            </a:pPr>
+            <a:r>
+              <a:t/>
+            </a:r>
+            <a:endParaRPr/>
+          </a:p>
+        </p:txBody>
+      </p:sp>
+      <p:sp>
+        <p:nvSpPr>
+          <p:cNvPr id="119" name="Google Shape;119;p20"/>
+          <p:cNvSpPr/>
+          <p:nvPr/>
+        </p:nvSpPr>
+        <p:spPr>
+          <a:xfrm>
+            <a:off x="504000" y="1326600"/>
+            <a:ext cx="9070800" cy="3287400"/>
+          </a:xfrm>
+          <a:prstGeom prst="rect">
+            <a:avLst/>
+          </a:prstGeom>
+          <a:noFill/>
+          <a:ln>
+            <a:noFill/>
+          </a:ln>
+        </p:spPr>
+        <p:txBody>
+          <a:bodyPr anchorCtr="0" anchor="t" bIns="0" lIns="0" spcFirstLastPara="1" rIns="0" wrap="square" tIns="0">
+            <a:noAutofit/>
+          </a:bodyPr>
+          <a:lstStyle/>
+          <a:p>
+            <a:pPr indent="0" lvl="0" marL="0" marR="0" rtl="0" algn="l">
+              <a:lnSpc>
+                <a:spcPct val="100000"/>
+              </a:lnSpc>
+              <a:spcBef>
+                <a:spcPts val="0"/>
+              </a:spcBef>
+              <a:spcAft>
+                <a:spcPts val="0"/>
+              </a:spcAft>
+              <a:buNone/>
+            </a:pPr>
+            <a:r>
+              <a:t/>
+            </a:r>
+            <a:endParaRPr b="0" sz="1800" strike="noStrike">
+              <a:solidFill>
+                <a:schemeClr val="dk1"/>
+              </a:solidFill>
+              <a:latin typeface="Arial"/>
+              <a:ea typeface="Arial"/>
+              <a:cs typeface="Arial"/>
+              <a:sym typeface="Arial"/>
+            </a:endParaRPr>
+          </a:p>
+          <a:p>
+            <a:pPr indent="0" lvl="0" marL="0" marR="0" rtl="0" algn="l">
+              <a:lnSpc>
+                <a:spcPct val="100000"/>
+              </a:lnSpc>
+              <a:spcBef>
+                <a:spcPts val="0"/>
+              </a:spcBef>
+              <a:spcAft>
+                <a:spcPts val="0"/>
+              </a:spcAft>
+              <a:buNone/>
+            </a:pPr>
+            <a:r>
+              <a:rPr b="0" lang="en-US" sz="3600" strike="noStrike">
+                <a:solidFill>
+                  <a:srgbClr val="000000"/>
+                </a:solidFill>
+                <a:latin typeface="Arial"/>
+                <a:ea typeface="Arial"/>
+                <a:cs typeface="Arial"/>
+                <a:sym typeface="Arial"/>
+              </a:rPr>
+              <a:t> </a:t>
+            </a:r>
+            <a:endParaRPr b="0" sz="3600" strike="noStrike">
+              <a:solidFill>
+                <a:schemeClr val="dk1"/>
+              </a:solidFill>
+              <a:latin typeface="Arial"/>
+              <a:ea typeface="Arial"/>
+              <a:cs typeface="Arial"/>
+              <a:sym typeface="Arial"/>
+            </a:endParaRPr>
+          </a:p>
+          <a:p>
+            <a:pPr indent="0" lvl="0" marL="0" marR="0" rtl="0" algn="l">
+              <a:lnSpc>
+                <a:spcPct val="100000"/>
+              </a:lnSpc>
+              <a:spcBef>
+                <a:spcPts val="0"/>
+              </a:spcBef>
+              <a:spcAft>
+                <a:spcPts val="0"/>
+              </a:spcAft>
+              <a:buNone/>
+            </a:pPr>
+            <a:r>
+              <a:t/>
+            </a:r>
+            <a:endParaRPr b="0" sz="3600" strike="noStrike">
+              <a:solidFill>
+                <a:schemeClr val="dk1"/>
+              </a:solidFill>
+              <a:latin typeface="Arial"/>
+              <a:ea typeface="Arial"/>
+              <a:cs typeface="Arial"/>
+              <a:sym typeface="Arial"/>
+            </a:endParaRPr>
+          </a:p>
+        </p:txBody>
+      </p:sp>
+      <p:sp>
+        <p:nvSpPr>
+          <p:cNvPr id="120" name="Google Shape;120;p20"/>
+          <p:cNvSpPr/>
+          <p:nvPr/>
+        </p:nvSpPr>
+        <p:spPr>
+          <a:xfrm>
+            <a:off x="503650" y="1165075"/>
+            <a:ext cx="9063000" cy="4446600"/>
+          </a:xfrm>
+          <a:prstGeom prst="rect">
+            <a:avLst/>
+          </a:prstGeom>
+          <a:noFill/>
+          <a:ln>
+            <a:noFill/>
+          </a:ln>
+        </p:spPr>
+        <p:txBody>
+          <a:bodyPr anchorCtr="0" anchor="t" bIns="0" lIns="0" spcFirstLastPara="1" rIns="0" wrap="square" tIns="0">
+            <a:noAutofit/>
+          </a:bodyPr>
+          <a:lstStyle/>
+          <a:p>
+            <a:pPr indent="0" lvl="0" marL="0" marR="0" rtl="0" algn="l">
+              <a:lnSpc>
+                <a:spcPct val="90000"/>
+              </a:lnSpc>
+              <a:spcBef>
+                <a:spcPts val="1000"/>
+              </a:spcBef>
+              <a:spcAft>
+                <a:spcPts val="0"/>
+              </a:spcAft>
+              <a:buNone/>
+            </a:pPr>
+            <a:r>
+              <a:rPr lang="en-US" sz="2400">
+                <a:solidFill>
+                  <a:schemeClr val="dk1"/>
+                </a:solidFill>
+              </a:rPr>
+              <a:t>Now it’s your turn. Open the file “Navigating a File System - Classwork” and complete the assignment. Remember to click the blue “Submit” button when you are done. Assignments will NOT be graded until you do so.</a:t>
+            </a:r>
+            <a:endParaRPr sz="2400">
+              <a:solidFill>
+                <a:schemeClr val="dk1"/>
+              </a:solidFill>
+            </a:endParaRPr>
+          </a:p>
+          <a:p>
+            <a:pPr indent="0" lvl="0" marL="0" marR="0" rtl="0" algn="l">
+              <a:lnSpc>
+                <a:spcPct val="90000"/>
+              </a:lnSpc>
+              <a:spcBef>
+                <a:spcPts val="1000"/>
+              </a:spcBef>
+              <a:spcAft>
+                <a:spcPts val="0"/>
+              </a:spcAft>
+              <a:buNone/>
+            </a:pPr>
+            <a:r>
+              <a:rPr lang="en-US" sz="2000">
+                <a:solidFill>
+                  <a:schemeClr val="dk1"/>
+                </a:solidFill>
+              </a:rPr>
+              <a:t>All assignments have a due date on Google Classroom, after which Mr. Lee may grade them at anytime. They will be considered late if not submitted by the time he grades it. All unsubmitted assignments will have a grade of 0 on PupilPath.</a:t>
+            </a:r>
+            <a:endParaRPr sz="2000">
+              <a:solidFill>
+                <a:schemeClr val="dk1"/>
+              </a:solidFill>
+            </a:endParaRPr>
+          </a:p>
+          <a:p>
+            <a:pPr indent="0" lvl="0" marL="0" marR="0" rtl="0" algn="l">
+              <a:lnSpc>
+                <a:spcPct val="90000"/>
+              </a:lnSpc>
+              <a:spcBef>
+                <a:spcPts val="1000"/>
+              </a:spcBef>
+              <a:spcAft>
+                <a:spcPts val="0"/>
+              </a:spcAft>
+              <a:buNone/>
+            </a:pPr>
+            <a:r>
+              <a:rPr lang="en-US" sz="2000">
+                <a:solidFill>
+                  <a:schemeClr val="dk1"/>
+                </a:solidFill>
+              </a:rPr>
+              <a:t>You can resubmit each assignment once, whether as makeup or for higher grade. Email Mr. Lee with the title of the assignment when it is done, otherwise the request will not be fulfilled. The second grade will be final.</a:t>
+            </a:r>
+            <a:endParaRPr sz="2000">
+              <a:solidFill>
+                <a:schemeClr val="dk1"/>
+              </a:solidFill>
+            </a:endParaRPr>
+          </a:p>
+          <a:p>
+            <a:pPr indent="0" lvl="0" marL="0" marR="0" rtl="0" algn="l">
+              <a:lnSpc>
+                <a:spcPct val="90000"/>
+              </a:lnSpc>
+              <a:spcBef>
+                <a:spcPts val="1000"/>
+              </a:spcBef>
+              <a:spcAft>
+                <a:spcPts val="0"/>
+              </a:spcAft>
+              <a:buNone/>
+            </a:pPr>
+            <a:r>
+              <a:rPr lang="en-US" sz="2000">
+                <a:solidFill>
+                  <a:schemeClr val="dk1"/>
+                </a:solidFill>
+              </a:rPr>
+              <a:t>Late penalty of up to 25% will be assessed if submitted before the corresponding unit exam, although most of the times only 5-10% will be deducted if submitted within a reasonable time. After that unit’s exam, up to 75% will be deducted.</a:t>
+            </a:r>
+            <a:endParaRPr sz="2000">
+              <a:solidFill>
+                <a:schemeClr val="dk1"/>
+              </a:solidFill>
+            </a:endParaRPr>
+          </a:p>
+        </p:txBody>
+      </p:sp>
+    </p:spTree>
+  </p:cSld>
+  <p:clrMapOvr>
+    <a:masterClrMapping/>
+  </p:clrMapOvr>
+</p:sld>
+</file>
+
+<file path=ppt/slides/slide8.xml><?xml version="1.0" encoding="utf-8"?>
+<p:sld xmlns:a="http://schemas.openxmlformats.org/drawingml/2006/main" xmlns:r="http://schemas.openxmlformats.org/officeDocument/2006/relationships" xmlns:mc="http://schemas.openxmlformats.org/markup-compatibility/2006" xmlns:mv="urn:schemas-microsoft-com:mac:vml" xmlns:p="http://schemas.openxmlformats.org/presentationml/2006/main" xmlns:c="http://schemas.openxmlformats.org/drawingml/2006/chart" xmlns:dgm="http://schemas.openxmlformats.org/drawingml/2006/diagram" xmlns:o="urn:schemas-microsoft-com:office:office" xmlns:v="urn:schemas-microsoft-com:vml" xmlns:pvml="urn:schemas-microsoft-com:office:powerpoint" xmlns:com="http://schemas.openxmlformats.org/drawingml/2006/compatibility" xmlns:p14="http://schemas.microsoft.com/office/powerpoint/2010/main" xmlns:p15="http://schemas.microsoft.com/office/powerpoint/2012/main" xmlns:ahyp="http://schemas.microsoft.com/office/drawing/2018/hyperlinkcolor" show="0">
+  <p:cSld>
+    <p:spTree>
+      <p:nvGrpSpPr>
+        <p:cNvPr id="124" name="Shape 124"/>
+        <p:cNvGrpSpPr/>
+        <p:nvPr/>
+      </p:nvGrpSpPr>
+      <p:grpSpPr>
+        <a:xfrm>
+          <a:off x="0" y="0"/>
+          <a:ext cx="0" cy="0"/>
+          <a:chOff x="0" y="0"/>
+          <a:chExt cx="0" cy="0"/>
+        </a:xfrm>
+      </p:grpSpPr>
+      <p:sp>
+        <p:nvSpPr>
+          <p:cNvPr id="125" name="Google Shape;125;p21"/>
+          <p:cNvSpPr/>
+          <p:nvPr/>
+        </p:nvSpPr>
+        <p:spPr>
+          <a:xfrm>
+            <a:off x="503640" y="226080"/>
+            <a:ext cx="9063000" cy="939000"/>
+          </a:xfrm>
+          <a:prstGeom prst="rect">
+            <a:avLst/>
+          </a:prstGeom>
+          <a:noFill/>
+          <a:ln>
+            <a:noFill/>
+          </a:ln>
+        </p:spPr>
+        <p:txBody>
+          <a:bodyPr anchorCtr="0" anchor="ctr" bIns="0" lIns="0" spcFirstLastPara="1" rIns="0" wrap="square" tIns="0">
+            <a:noAutofit/>
+          </a:bodyPr>
+          <a:lstStyle/>
+          <a:p>
+            <a:pPr indent="0" lvl="0" marL="0" marR="0" rtl="0" algn="ctr">
+              <a:lnSpc>
+                <a:spcPct val="100000"/>
+              </a:lnSpc>
+              <a:spcBef>
+                <a:spcPts val="0"/>
+              </a:spcBef>
+              <a:spcAft>
+                <a:spcPts val="0"/>
+              </a:spcAft>
+              <a:buNone/>
+            </a:pPr>
+            <a:r>
+              <a:rPr b="1" i="1" lang="en-US" sz="4000" strike="noStrike">
+                <a:solidFill>
+                  <a:srgbClr val="000000"/>
+                </a:solidFill>
+                <a:latin typeface="Arial"/>
+                <a:ea typeface="Arial"/>
+                <a:cs typeface="Arial"/>
+                <a:sym typeface="Arial"/>
+              </a:rPr>
+              <a:t>Objective: Navigating a File System</a:t>
+            </a:r>
+            <a:endParaRPr b="0" sz="4000" strike="noStrike">
+              <a:solidFill>
+                <a:schemeClr val="dk1"/>
+              </a:solidFill>
+              <a:latin typeface="Arial"/>
+              <a:ea typeface="Arial"/>
+              <a:cs typeface="Arial"/>
+              <a:sym typeface="Arial"/>
+            </a:endParaRPr>
+          </a:p>
+        </p:txBody>
+      </p:sp>
+      <p:sp>
+        <p:nvSpPr>
+          <p:cNvPr id="126" name="Google Shape;126;p21"/>
+          <p:cNvSpPr/>
+          <p:nvPr/>
+        </p:nvSpPr>
+        <p:spPr>
+          <a:xfrm>
+            <a:off x="457200" y="1554480"/>
+            <a:ext cx="9063000" cy="3837900"/>
+          </a:xfrm>
+          <a:prstGeom prst="rect">
+            <a:avLst/>
+          </a:prstGeom>
+          <a:noFill/>
+          <a:ln>
+            <a:noFill/>
+          </a:ln>
+        </p:spPr>
+        <p:txBody>
+          <a:bodyPr anchorCtr="0" anchor="ctr" bIns="91425" lIns="91425" spcFirstLastPara="1" rIns="91425" wrap="square" tIns="91425">
+            <a:noAutofit/>
+          </a:bodyPr>
+          <a:lstStyle/>
+          <a:p>
+            <a:pPr indent="0" lvl="0" marL="0" rtl="0" algn="l">
+              <a:spcBef>
+                <a:spcPts val="0"/>
+              </a:spcBef>
+              <a:spcAft>
+                <a:spcPts val="0"/>
+              </a:spcAft>
+              <a:buNone/>
+            </a:pPr>
+            <a:r>
+              <a:t/>
+            </a:r>
+            <a:endParaRPr/>
+          </a:p>
+        </p:txBody>
+      </p:sp>
+      <p:sp>
+        <p:nvSpPr>
+          <p:cNvPr id="127" name="Google Shape;127;p21"/>
+          <p:cNvSpPr/>
+          <p:nvPr/>
+        </p:nvSpPr>
+        <p:spPr>
+          <a:xfrm>
+            <a:off x="504000" y="1326600"/>
+            <a:ext cx="9070800" cy="3287400"/>
+          </a:xfrm>
+          <a:prstGeom prst="rect">
+            <a:avLst/>
+          </a:prstGeom>
+          <a:noFill/>
+          <a:ln>
+            <a:noFill/>
+          </a:ln>
+        </p:spPr>
+        <p:txBody>
+          <a:bodyPr anchorCtr="0" anchor="t" bIns="0" lIns="0" spcFirstLastPara="1" rIns="0" wrap="square" tIns="0">
+            <a:noAutofit/>
+          </a:bodyPr>
+          <a:lstStyle/>
+          <a:p>
+            <a:pPr indent="0" lvl="0" marL="0" marR="0" rtl="0" algn="l">
+              <a:lnSpc>
+                <a:spcPct val="100000"/>
+              </a:lnSpc>
+              <a:spcBef>
+                <a:spcPts val="0"/>
+              </a:spcBef>
+              <a:spcAft>
+                <a:spcPts val="0"/>
+              </a:spcAft>
+              <a:buNone/>
+            </a:pPr>
+            <a:r>
+              <a:t/>
+            </a:r>
+            <a:endParaRPr b="0" sz="1800" strike="noStrike">
+              <a:solidFill>
+                <a:schemeClr val="dk1"/>
+              </a:solidFill>
+              <a:latin typeface="Arial"/>
+              <a:ea typeface="Arial"/>
+              <a:cs typeface="Arial"/>
+              <a:sym typeface="Arial"/>
+            </a:endParaRPr>
+          </a:p>
+          <a:p>
+            <a:pPr indent="0" lvl="0" marL="0" marR="0" rtl="0" algn="l">
+              <a:lnSpc>
+                <a:spcPct val="100000"/>
+              </a:lnSpc>
+              <a:spcBef>
+                <a:spcPts val="0"/>
+              </a:spcBef>
+              <a:spcAft>
+                <a:spcPts val="0"/>
+              </a:spcAft>
+              <a:buNone/>
+            </a:pPr>
+            <a:r>
+              <a:rPr b="0" lang="en-US" sz="3600" strike="noStrike">
+                <a:solidFill>
+                  <a:srgbClr val="000000"/>
+                </a:solidFill>
+                <a:latin typeface="Arial"/>
+                <a:ea typeface="Arial"/>
+                <a:cs typeface="Arial"/>
+                <a:sym typeface="Arial"/>
+              </a:rPr>
+              <a:t> </a:t>
+            </a:r>
+            <a:endParaRPr b="0" sz="3600" strike="noStrike">
+              <a:solidFill>
+                <a:schemeClr val="dk1"/>
+              </a:solidFill>
+              <a:latin typeface="Arial"/>
+              <a:ea typeface="Arial"/>
+              <a:cs typeface="Arial"/>
+              <a:sym typeface="Arial"/>
+            </a:endParaRPr>
+          </a:p>
+          <a:p>
+            <a:pPr indent="0" lvl="0" marL="0" marR="0" rtl="0" algn="l">
+              <a:lnSpc>
+                <a:spcPct val="100000"/>
+              </a:lnSpc>
+              <a:spcBef>
+                <a:spcPts val="0"/>
+              </a:spcBef>
+              <a:spcAft>
+                <a:spcPts val="0"/>
+              </a:spcAft>
+              <a:buNone/>
+            </a:pPr>
+            <a:r>
+              <a:t/>
+            </a:r>
+            <a:endParaRPr b="0" sz="3600" strike="noStrike">
+              <a:solidFill>
+                <a:schemeClr val="dk1"/>
+              </a:solidFill>
+              <a:latin typeface="Arial"/>
+              <a:ea typeface="Arial"/>
+              <a:cs typeface="Arial"/>
+              <a:sym typeface="Arial"/>
+            </a:endParaRPr>
+          </a:p>
+        </p:txBody>
+      </p:sp>
+      <p:sp>
+        <p:nvSpPr>
+          <p:cNvPr id="128" name="Google Shape;128;p21"/>
           <p:cNvSpPr/>
           <p:nvPr/>
         </p:nvSpPr>
@@ -11118,7 +12553,7 @@
       </p:sp>
       <p:pic>
         <p:nvPicPr>
-          <p:cNvPr id="103" name="Google Shape;103;p18"/>
+          <p:cNvPr id="129" name="Google Shape;129;p21"/>
           <p:cNvPicPr preferRelativeResize="0"/>
           <p:nvPr/>
         </p:nvPicPr>
@@ -11144,380 +12579,6 @@
           </a:ln>
         </p:spPr>
       </p:pic>
-    </p:spTree>
-  </p:cSld>
-  <p:clrMapOvr>
-    <a:masterClrMapping/>
-  </p:clrMapOvr>
-</p:sld>
-</file>
-
-<file path=ppt/slides/slide6.xml><?xml version="1.0" encoding="utf-8"?>
-<p:sld xmlns:a="http://schemas.openxmlformats.org/drawingml/2006/main" xmlns:r="http://schemas.openxmlformats.org/officeDocument/2006/relationships" xmlns:mc="http://schemas.openxmlformats.org/markup-compatibility/2006" xmlns:mv="urn:schemas-microsoft-com:mac:vml" xmlns:p="http://schemas.openxmlformats.org/presentationml/2006/main" xmlns:c="http://schemas.openxmlformats.org/drawingml/2006/chart" xmlns:dgm="http://schemas.openxmlformats.org/drawingml/2006/diagram" xmlns:o="urn:schemas-microsoft-com:office:office" xmlns:v="urn:schemas-microsoft-com:vml" xmlns:pvml="urn:schemas-microsoft-com:office:powerpoint" xmlns:com="http://schemas.openxmlformats.org/drawingml/2006/compatibility" xmlns:p14="http://schemas.microsoft.com/office/powerpoint/2010/main" xmlns:p15="http://schemas.microsoft.com/office/powerpoint/2012/main">
-  <p:cSld>
-    <p:spTree>
-      <p:nvGrpSpPr>
-        <p:cNvPr id="107" name="Shape 107"/>
-        <p:cNvGrpSpPr/>
-        <p:nvPr/>
-      </p:nvGrpSpPr>
-      <p:grpSpPr>
-        <a:xfrm>
-          <a:off x="0" y="0"/>
-          <a:ext cx="0" cy="0"/>
-          <a:chOff x="0" y="0"/>
-          <a:chExt cx="0" cy="0"/>
-        </a:xfrm>
-      </p:grpSpPr>
-      <p:sp>
-        <p:nvSpPr>
-          <p:cNvPr id="108" name="Google Shape;108;p19"/>
-          <p:cNvSpPr/>
-          <p:nvPr/>
-        </p:nvSpPr>
-        <p:spPr>
-          <a:xfrm>
-            <a:off x="503640" y="226080"/>
-            <a:ext cx="9063000" cy="939000"/>
-          </a:xfrm>
-          <a:prstGeom prst="rect">
-            <a:avLst/>
-          </a:prstGeom>
-          <a:noFill/>
-          <a:ln>
-            <a:noFill/>
-          </a:ln>
-        </p:spPr>
-        <p:txBody>
-          <a:bodyPr anchorCtr="0" anchor="ctr" bIns="0" lIns="0" spcFirstLastPara="1" rIns="0" wrap="square" tIns="0">
-            <a:noAutofit/>
-          </a:bodyPr>
-          <a:lstStyle/>
-          <a:p>
-            <a:pPr indent="0" lvl="0" marL="0" marR="0" rtl="0" algn="ctr">
-              <a:lnSpc>
-                <a:spcPct val="100000"/>
-              </a:lnSpc>
-              <a:spcBef>
-                <a:spcPts val="0"/>
-              </a:spcBef>
-              <a:spcAft>
-                <a:spcPts val="0"/>
-              </a:spcAft>
-              <a:buNone/>
-            </a:pPr>
-            <a:r>
-              <a:rPr b="1" i="1" lang="en-US" sz="4000" strike="noStrike">
-                <a:solidFill>
-                  <a:srgbClr val="000000"/>
-                </a:solidFill>
-                <a:latin typeface="Arial"/>
-                <a:ea typeface="Arial"/>
-                <a:cs typeface="Arial"/>
-                <a:sym typeface="Arial"/>
-              </a:rPr>
-              <a:t>Objective: Navigating a File System</a:t>
-            </a:r>
-            <a:endParaRPr b="0" sz="4000" strike="noStrike">
-              <a:solidFill>
-                <a:schemeClr val="dk1"/>
-              </a:solidFill>
-              <a:latin typeface="Arial"/>
-              <a:ea typeface="Arial"/>
-              <a:cs typeface="Arial"/>
-              <a:sym typeface="Arial"/>
-            </a:endParaRPr>
-          </a:p>
-        </p:txBody>
-      </p:sp>
-      <p:sp>
-        <p:nvSpPr>
-          <p:cNvPr id="109" name="Google Shape;109;p19"/>
-          <p:cNvSpPr/>
-          <p:nvPr/>
-        </p:nvSpPr>
-        <p:spPr>
-          <a:xfrm>
-            <a:off x="457200" y="1554480"/>
-            <a:ext cx="9063000" cy="3837900"/>
-          </a:xfrm>
-          <a:prstGeom prst="rect">
-            <a:avLst/>
-          </a:prstGeom>
-          <a:noFill/>
-          <a:ln>
-            <a:noFill/>
-          </a:ln>
-        </p:spPr>
-        <p:txBody>
-          <a:bodyPr anchorCtr="0" anchor="ctr" bIns="91425" lIns="91425" spcFirstLastPara="1" rIns="91425" wrap="square" tIns="91425">
-            <a:noAutofit/>
-          </a:bodyPr>
-          <a:lstStyle/>
-          <a:p>
-            <a:pPr indent="0" lvl="0" marL="0" rtl="0" algn="l">
-              <a:spcBef>
-                <a:spcPts val="0"/>
-              </a:spcBef>
-              <a:spcAft>
-                <a:spcPts val="0"/>
-              </a:spcAft>
-              <a:buNone/>
-            </a:pPr>
-            <a:r>
-              <a:t/>
-            </a:r>
-            <a:endParaRPr/>
-          </a:p>
-        </p:txBody>
-      </p:sp>
-      <p:sp>
-        <p:nvSpPr>
-          <p:cNvPr id="110" name="Google Shape;110;p19"/>
-          <p:cNvSpPr/>
-          <p:nvPr/>
-        </p:nvSpPr>
-        <p:spPr>
-          <a:xfrm>
-            <a:off x="504000" y="1326600"/>
-            <a:ext cx="9070800" cy="3287400"/>
-          </a:xfrm>
-          <a:prstGeom prst="rect">
-            <a:avLst/>
-          </a:prstGeom>
-          <a:noFill/>
-          <a:ln>
-            <a:noFill/>
-          </a:ln>
-        </p:spPr>
-        <p:txBody>
-          <a:bodyPr anchorCtr="0" anchor="t" bIns="0" lIns="0" spcFirstLastPara="1" rIns="0" wrap="square" tIns="0">
-            <a:noAutofit/>
-          </a:bodyPr>
-          <a:lstStyle/>
-          <a:p>
-            <a:pPr indent="0" lvl="0" marL="0" marR="0" rtl="0" algn="l">
-              <a:lnSpc>
-                <a:spcPct val="100000"/>
-              </a:lnSpc>
-              <a:spcBef>
-                <a:spcPts val="0"/>
-              </a:spcBef>
-              <a:spcAft>
-                <a:spcPts val="0"/>
-              </a:spcAft>
-              <a:buNone/>
-            </a:pPr>
-            <a:r>
-              <a:t/>
-            </a:r>
-            <a:endParaRPr b="0" sz="1800" strike="noStrike">
-              <a:solidFill>
-                <a:schemeClr val="dk1"/>
-              </a:solidFill>
-              <a:latin typeface="Arial"/>
-              <a:ea typeface="Arial"/>
-              <a:cs typeface="Arial"/>
-              <a:sym typeface="Arial"/>
-            </a:endParaRPr>
-          </a:p>
-          <a:p>
-            <a:pPr indent="0" lvl="0" marL="0" marR="0" rtl="0" algn="l">
-              <a:lnSpc>
-                <a:spcPct val="100000"/>
-              </a:lnSpc>
-              <a:spcBef>
-                <a:spcPts val="0"/>
-              </a:spcBef>
-              <a:spcAft>
-                <a:spcPts val="0"/>
-              </a:spcAft>
-              <a:buNone/>
-            </a:pPr>
-            <a:r>
-              <a:rPr b="0" lang="en-US" sz="3600" strike="noStrike">
-                <a:solidFill>
-                  <a:srgbClr val="000000"/>
-                </a:solidFill>
-                <a:latin typeface="Arial"/>
-                <a:ea typeface="Arial"/>
-                <a:cs typeface="Arial"/>
-                <a:sym typeface="Arial"/>
-              </a:rPr>
-              <a:t> </a:t>
-            </a:r>
-            <a:endParaRPr b="0" sz="3600" strike="noStrike">
-              <a:solidFill>
-                <a:schemeClr val="dk1"/>
-              </a:solidFill>
-              <a:latin typeface="Arial"/>
-              <a:ea typeface="Arial"/>
-              <a:cs typeface="Arial"/>
-              <a:sym typeface="Arial"/>
-            </a:endParaRPr>
-          </a:p>
-          <a:p>
-            <a:pPr indent="0" lvl="0" marL="0" marR="0" rtl="0" algn="l">
-              <a:lnSpc>
-                <a:spcPct val="100000"/>
-              </a:lnSpc>
-              <a:spcBef>
-                <a:spcPts val="0"/>
-              </a:spcBef>
-              <a:spcAft>
-                <a:spcPts val="0"/>
-              </a:spcAft>
-              <a:buNone/>
-            </a:pPr>
-            <a:r>
-              <a:t/>
-            </a:r>
-            <a:endParaRPr b="0" sz="3600" strike="noStrike">
-              <a:solidFill>
-                <a:schemeClr val="dk1"/>
-              </a:solidFill>
-              <a:latin typeface="Arial"/>
-              <a:ea typeface="Arial"/>
-              <a:cs typeface="Arial"/>
-              <a:sym typeface="Arial"/>
-            </a:endParaRPr>
-          </a:p>
-        </p:txBody>
-      </p:sp>
-      <p:sp>
-        <p:nvSpPr>
-          <p:cNvPr id="111" name="Google Shape;111;p19"/>
-          <p:cNvSpPr/>
-          <p:nvPr/>
-        </p:nvSpPr>
-        <p:spPr>
-          <a:xfrm>
-            <a:off x="503650" y="1165075"/>
-            <a:ext cx="9063000" cy="4446600"/>
-          </a:xfrm>
-          <a:prstGeom prst="rect">
-            <a:avLst/>
-          </a:prstGeom>
-          <a:noFill/>
-          <a:ln>
-            <a:noFill/>
-          </a:ln>
-        </p:spPr>
-        <p:txBody>
-          <a:bodyPr anchorCtr="0" anchor="t" bIns="0" lIns="0" spcFirstLastPara="1" rIns="0" wrap="square" tIns="0">
-            <a:noAutofit/>
-          </a:bodyPr>
-          <a:lstStyle/>
-          <a:p>
-            <a:pPr indent="0" lvl="0" marL="0" marR="0" rtl="0" algn="l">
-              <a:lnSpc>
-                <a:spcPct val="90000"/>
-              </a:lnSpc>
-              <a:spcBef>
-                <a:spcPts val="1000"/>
-              </a:spcBef>
-              <a:spcAft>
-                <a:spcPts val="0"/>
-              </a:spcAft>
-              <a:buNone/>
-            </a:pPr>
-            <a:r>
-              <a:rPr lang="en-US" sz="2400">
-                <a:solidFill>
-                  <a:schemeClr val="dk1"/>
-                </a:solidFill>
-              </a:rPr>
-              <a:t>Now it’s your turn. Open the file “Navigating a File System - Classwork” and complete the assignment. Remember to click the blue “Submit” button when you are done. Assignments will NOT be graded until you do so.</a:t>
-            </a:r>
-            <a:endParaRPr sz="2400">
-              <a:solidFill>
-                <a:schemeClr val="dk1"/>
-              </a:solidFill>
-            </a:endParaRPr>
-          </a:p>
-          <a:p>
-            <a:pPr indent="0" lvl="0" marL="0" marR="0" rtl="0" algn="l">
-              <a:lnSpc>
-                <a:spcPct val="90000"/>
-              </a:lnSpc>
-              <a:spcBef>
-                <a:spcPts val="1000"/>
-              </a:spcBef>
-              <a:spcAft>
-                <a:spcPts val="0"/>
-              </a:spcAft>
-              <a:buNone/>
-            </a:pPr>
-            <a:r>
-              <a:rPr lang="en-US" sz="2000">
-                <a:solidFill>
-                  <a:schemeClr val="dk1"/>
-                </a:solidFill>
-              </a:rPr>
-              <a:t>All assignments have a due date on Google Classroom, after which Mr. Lee may grade them at anytime. They will be considered late if not submitted by the time he grades it. All unsubmitted assignments will have a grade of 0 on PupilPath.</a:t>
-            </a:r>
-            <a:endParaRPr sz="2000">
-              <a:solidFill>
-                <a:schemeClr val="dk1"/>
-              </a:solidFill>
-            </a:endParaRPr>
-          </a:p>
-          <a:p>
-            <a:pPr indent="0" lvl="0" marL="0" marR="0" rtl="0" algn="l">
-              <a:lnSpc>
-                <a:spcPct val="90000"/>
-              </a:lnSpc>
-              <a:spcBef>
-                <a:spcPts val="1000"/>
-              </a:spcBef>
-              <a:spcAft>
-                <a:spcPts val="0"/>
-              </a:spcAft>
-              <a:buNone/>
-            </a:pPr>
-            <a:r>
-              <a:rPr lang="en-US" sz="2000">
-                <a:solidFill>
-                  <a:schemeClr val="dk1"/>
-                </a:solidFill>
-              </a:rPr>
-              <a:t>You can resubmit each assignment once, whether as makeup or for higher grade. Email Mr. Lee with the title of the assignment when it is done, otherwise the request will not be fulfilled. The second grade will be final.</a:t>
-            </a:r>
-            <a:endParaRPr sz="2000">
-              <a:solidFill>
-                <a:schemeClr val="dk1"/>
-              </a:solidFill>
-            </a:endParaRPr>
-          </a:p>
-          <a:p>
-            <a:pPr indent="0" lvl="0" marL="0" marR="0" rtl="0" algn="l">
-              <a:lnSpc>
-                <a:spcPct val="90000"/>
-              </a:lnSpc>
-              <a:spcBef>
-                <a:spcPts val="1000"/>
-              </a:spcBef>
-              <a:spcAft>
-                <a:spcPts val="0"/>
-              </a:spcAft>
-              <a:buNone/>
-            </a:pPr>
-            <a:r>
-              <a:rPr lang="en-US" sz="2000">
-                <a:solidFill>
-                  <a:schemeClr val="dk1"/>
-                </a:solidFill>
-              </a:rPr>
-              <a:t>Late penalty of up to 25% will be assessed if submitted before the corresponding unit exam, although most of the times only 5-10% will be deducted if submitted within a reasonable time. After that unit’s exam, up to 75% will be deducted.</a:t>
-            </a:r>
-            <a:endParaRPr sz="2000">
-              <a:solidFill>
-                <a:schemeClr val="dk1"/>
-              </a:solidFill>
-            </a:endParaRPr>
-          </a:p>
-        </p:txBody>
-      </p:sp>
     </p:spTree>
   </p:cSld>
   <p:clrMapOvr>

</xml_diff>